<commit_message>
Set up all the introduction pages.
The language need further polish.

Should also change the image in the FAQ page.
</commit_message>
<xml_diff>
--- a/doc/Introduction.pptx
+++ b/doc/Introduction.pptx
@@ -2,19 +2,23 @@
 <file path=ppt/presentation.xml><?xml version="1.0" encoding="utf-8"?>
 <p:presentation xmlns:a="http://schemas.openxmlformats.org/drawingml/2006/main" xmlns:r="http://schemas.openxmlformats.org/officeDocument/2006/relationships" xmlns:p="http://schemas.openxmlformats.org/presentationml/2006/main" saveSubsetFonts="1">
   <p:sldMasterIdLst>
-    <p:sldMasterId id="2147483648" r:id="rId1"/>
+    <p:sldMasterId id="2147483660" r:id="rId1"/>
   </p:sldMasterIdLst>
   <p:sldIdLst>
-    <p:sldId id="256" r:id="rId2"/>
+    <p:sldId id="257" r:id="rId2"/>
+    <p:sldId id="258" r:id="rId3"/>
+    <p:sldId id="259" r:id="rId4"/>
+    <p:sldId id="260" r:id="rId5"/>
+    <p:sldId id="256" r:id="rId6"/>
   </p:sldIdLst>
-  <p:sldSz cx="12192000" cy="6858000"/>
+  <p:sldSz cx="10572750" cy="4095750"/>
   <p:notesSz cx="6858000" cy="9144000"/>
   <p:defaultTextStyle>
     <a:defPPr>
       <a:defRPr lang="en-US"/>
     </a:defPPr>
-    <a:lvl1pPr marL="0" algn="l" defTabSz="914400" rtl="0" eaLnBrk="1" latinLnBrk="0" hangingPunct="1">
-      <a:defRPr sz="1800" kern="1200">
+    <a:lvl1pPr marL="0" algn="l" defTabSz="704088" rtl="0" eaLnBrk="1" latinLnBrk="0" hangingPunct="1">
+      <a:defRPr sz="1386" kern="1200">
         <a:solidFill>
           <a:schemeClr val="tx1"/>
         </a:solidFill>
@@ -23,8 +27,8 @@
         <a:cs typeface="+mn-cs"/>
       </a:defRPr>
     </a:lvl1pPr>
-    <a:lvl2pPr marL="457200" algn="l" defTabSz="914400" rtl="0" eaLnBrk="1" latinLnBrk="0" hangingPunct="1">
-      <a:defRPr sz="1800" kern="1200">
+    <a:lvl2pPr marL="352044" algn="l" defTabSz="704088" rtl="0" eaLnBrk="1" latinLnBrk="0" hangingPunct="1">
+      <a:defRPr sz="1386" kern="1200">
         <a:solidFill>
           <a:schemeClr val="tx1"/>
         </a:solidFill>
@@ -33,8 +37,8 @@
         <a:cs typeface="+mn-cs"/>
       </a:defRPr>
     </a:lvl2pPr>
-    <a:lvl3pPr marL="914400" algn="l" defTabSz="914400" rtl="0" eaLnBrk="1" latinLnBrk="0" hangingPunct="1">
-      <a:defRPr sz="1800" kern="1200">
+    <a:lvl3pPr marL="704088" algn="l" defTabSz="704088" rtl="0" eaLnBrk="1" latinLnBrk="0" hangingPunct="1">
+      <a:defRPr sz="1386" kern="1200">
         <a:solidFill>
           <a:schemeClr val="tx1"/>
         </a:solidFill>
@@ -43,8 +47,8 @@
         <a:cs typeface="+mn-cs"/>
       </a:defRPr>
     </a:lvl3pPr>
-    <a:lvl4pPr marL="1371600" algn="l" defTabSz="914400" rtl="0" eaLnBrk="1" latinLnBrk="0" hangingPunct="1">
-      <a:defRPr sz="1800" kern="1200">
+    <a:lvl4pPr marL="1056132" algn="l" defTabSz="704088" rtl="0" eaLnBrk="1" latinLnBrk="0" hangingPunct="1">
+      <a:defRPr sz="1386" kern="1200">
         <a:solidFill>
           <a:schemeClr val="tx1"/>
         </a:solidFill>
@@ -53,8 +57,8 @@
         <a:cs typeface="+mn-cs"/>
       </a:defRPr>
     </a:lvl4pPr>
-    <a:lvl5pPr marL="1828800" algn="l" defTabSz="914400" rtl="0" eaLnBrk="1" latinLnBrk="0" hangingPunct="1">
-      <a:defRPr sz="1800" kern="1200">
+    <a:lvl5pPr marL="1408176" algn="l" defTabSz="704088" rtl="0" eaLnBrk="1" latinLnBrk="0" hangingPunct="1">
+      <a:defRPr sz="1386" kern="1200">
         <a:solidFill>
           <a:schemeClr val="tx1"/>
         </a:solidFill>
@@ -63,8 +67,8 @@
         <a:cs typeface="+mn-cs"/>
       </a:defRPr>
     </a:lvl5pPr>
-    <a:lvl6pPr marL="2286000" algn="l" defTabSz="914400" rtl="0" eaLnBrk="1" latinLnBrk="0" hangingPunct="1">
-      <a:defRPr sz="1800" kern="1200">
+    <a:lvl6pPr marL="1760220" algn="l" defTabSz="704088" rtl="0" eaLnBrk="1" latinLnBrk="0" hangingPunct="1">
+      <a:defRPr sz="1386" kern="1200">
         <a:solidFill>
           <a:schemeClr val="tx1"/>
         </a:solidFill>
@@ -73,8 +77,8 @@
         <a:cs typeface="+mn-cs"/>
       </a:defRPr>
     </a:lvl6pPr>
-    <a:lvl7pPr marL="2743200" algn="l" defTabSz="914400" rtl="0" eaLnBrk="1" latinLnBrk="0" hangingPunct="1">
-      <a:defRPr sz="1800" kern="1200">
+    <a:lvl7pPr marL="2112264" algn="l" defTabSz="704088" rtl="0" eaLnBrk="1" latinLnBrk="0" hangingPunct="1">
+      <a:defRPr sz="1386" kern="1200">
         <a:solidFill>
           <a:schemeClr val="tx1"/>
         </a:solidFill>
@@ -83,8 +87,8 @@
         <a:cs typeface="+mn-cs"/>
       </a:defRPr>
     </a:lvl7pPr>
-    <a:lvl8pPr marL="3200400" algn="l" defTabSz="914400" rtl="0" eaLnBrk="1" latinLnBrk="0" hangingPunct="1">
-      <a:defRPr sz="1800" kern="1200">
+    <a:lvl8pPr marL="2464308" algn="l" defTabSz="704088" rtl="0" eaLnBrk="1" latinLnBrk="0" hangingPunct="1">
+      <a:defRPr sz="1386" kern="1200">
         <a:solidFill>
           <a:schemeClr val="tx1"/>
         </a:solidFill>
@@ -93,8 +97,8 @@
         <a:cs typeface="+mn-cs"/>
       </a:defRPr>
     </a:lvl8pPr>
-    <a:lvl9pPr marL="3657600" algn="l" defTabSz="914400" rtl="0" eaLnBrk="1" latinLnBrk="0" hangingPunct="1">
-      <a:defRPr sz="1800" kern="1200">
+    <a:lvl9pPr marL="2816352" algn="l" defTabSz="704088" rtl="0" eaLnBrk="1" latinLnBrk="0" hangingPunct="1">
+      <a:defRPr sz="1386" kern="1200">
         <a:solidFill>
           <a:schemeClr val="tx1"/>
         </a:solidFill>
@@ -141,15 +145,15 @@
         </p:nvSpPr>
         <p:spPr>
           <a:xfrm>
-            <a:off x="1524000" y="1122363"/>
-            <a:ext cx="9144000" cy="2387600"/>
+            <a:off x="1321594" y="670300"/>
+            <a:ext cx="7929563" cy="1425928"/>
           </a:xfrm>
         </p:spPr>
         <p:txBody>
           <a:bodyPr anchor="b"/>
           <a:lstStyle>
             <a:lvl1pPr algn="ctr">
-              <a:defRPr sz="6000"/>
+              <a:defRPr sz="3583"/>
             </a:lvl1pPr>
           </a:lstStyle>
           <a:p>
@@ -157,7 +161,7 @@
               <a:rPr lang="en-US" smtClean="0"/>
               <a:t>Click to edit Master title style</a:t>
             </a:r>
-            <a:endParaRPr lang="en-US"/>
+            <a:endParaRPr lang="en-US" dirty="0"/>
           </a:p>
         </p:txBody>
       </p:sp>
@@ -173,8 +177,8 @@
         </p:nvSpPr>
         <p:spPr>
           <a:xfrm>
-            <a:off x="1524000" y="3602038"/>
-            <a:ext cx="9144000" cy="1655762"/>
+            <a:off x="1321594" y="2151217"/>
+            <a:ext cx="7929563" cy="988858"/>
           </a:xfrm>
         </p:spPr>
         <p:txBody>
@@ -182,39 +186,39 @@
           <a:lstStyle>
             <a:lvl1pPr marL="0" indent="0" algn="ctr">
               <a:buNone/>
-              <a:defRPr sz="2400"/>
+              <a:defRPr sz="1433"/>
             </a:lvl1pPr>
-            <a:lvl2pPr marL="457200" indent="0" algn="ctr">
-              <a:buNone/>
-              <a:defRPr sz="2000"/>
+            <a:lvl2pPr marL="273040" indent="0" algn="ctr">
+              <a:buNone/>
+              <a:defRPr sz="1194"/>
             </a:lvl2pPr>
-            <a:lvl3pPr marL="914400" indent="0" algn="ctr">
-              <a:buNone/>
-              <a:defRPr sz="1800"/>
+            <a:lvl3pPr marL="546080" indent="0" algn="ctr">
+              <a:buNone/>
+              <a:defRPr sz="1075"/>
             </a:lvl3pPr>
-            <a:lvl4pPr marL="1371600" indent="0" algn="ctr">
-              <a:buNone/>
-              <a:defRPr sz="1600"/>
+            <a:lvl4pPr marL="819120" indent="0" algn="ctr">
+              <a:buNone/>
+              <a:defRPr sz="956"/>
             </a:lvl4pPr>
-            <a:lvl5pPr marL="1828800" indent="0" algn="ctr">
-              <a:buNone/>
-              <a:defRPr sz="1600"/>
+            <a:lvl5pPr marL="1092159" indent="0" algn="ctr">
+              <a:buNone/>
+              <a:defRPr sz="956"/>
             </a:lvl5pPr>
-            <a:lvl6pPr marL="2286000" indent="0" algn="ctr">
-              <a:buNone/>
-              <a:defRPr sz="1600"/>
+            <a:lvl6pPr marL="1365199" indent="0" algn="ctr">
+              <a:buNone/>
+              <a:defRPr sz="956"/>
             </a:lvl6pPr>
-            <a:lvl7pPr marL="2743200" indent="0" algn="ctr">
-              <a:buNone/>
-              <a:defRPr sz="1600"/>
+            <a:lvl7pPr marL="1638239" indent="0" algn="ctr">
+              <a:buNone/>
+              <a:defRPr sz="956"/>
             </a:lvl7pPr>
-            <a:lvl8pPr marL="3200400" indent="0" algn="ctr">
-              <a:buNone/>
-              <a:defRPr sz="1600"/>
+            <a:lvl8pPr marL="1911279" indent="0" algn="ctr">
+              <a:buNone/>
+              <a:defRPr sz="956"/>
             </a:lvl8pPr>
-            <a:lvl9pPr marL="3657600" indent="0" algn="ctr">
-              <a:buNone/>
-              <a:defRPr sz="1600"/>
+            <a:lvl9pPr marL="2184319" indent="0" algn="ctr">
+              <a:buNone/>
+              <a:defRPr sz="956"/>
             </a:lvl9pPr>
           </a:lstStyle>
           <a:p>
@@ -222,7 +226,7 @@
               <a:rPr lang="en-US" smtClean="0"/>
               <a:t>Click to edit Master subtitle style</a:t>
             </a:r>
-            <a:endParaRPr lang="en-US"/>
+            <a:endParaRPr lang="en-US" dirty="0"/>
           </a:p>
         </p:txBody>
       </p:sp>
@@ -294,7 +298,7 @@
     </p:spTree>
     <p:extLst>
       <p:ext uri="{BB962C8B-B14F-4D97-AF65-F5344CB8AC3E}">
-        <p14:creationId xmlns:p14="http://schemas.microsoft.com/office/powerpoint/2010/main" val="823014673"/>
+        <p14:creationId xmlns:p14="http://schemas.microsoft.com/office/powerpoint/2010/main" val="1923728937"/>
       </p:ext>
     </p:extLst>
   </p:cSld>
@@ -340,7 +344,7 @@
               <a:rPr lang="en-US" smtClean="0"/>
               <a:t>Click to edit Master title style</a:t>
             </a:r>
-            <a:endParaRPr lang="en-US"/>
+            <a:endParaRPr lang="en-US" dirty="0"/>
           </a:p>
         </p:txBody>
       </p:sp>
@@ -392,7 +396,7 @@
               <a:rPr lang="en-US" smtClean="0"/>
               <a:t>Fifth level</a:t>
             </a:r>
-            <a:endParaRPr lang="en-US"/>
+            <a:endParaRPr lang="en-US" dirty="0"/>
           </a:p>
         </p:txBody>
       </p:sp>
@@ -464,7 +468,7 @@
     </p:spTree>
     <p:extLst>
       <p:ext uri="{BB962C8B-B14F-4D97-AF65-F5344CB8AC3E}">
-        <p14:creationId xmlns:p14="http://schemas.microsoft.com/office/powerpoint/2010/main" val="747725054"/>
+        <p14:creationId xmlns:p14="http://schemas.microsoft.com/office/powerpoint/2010/main" val="5106016"/>
       </p:ext>
     </p:extLst>
   </p:cSld>
@@ -503,8 +507,8 @@
         </p:nvSpPr>
         <p:spPr>
           <a:xfrm>
-            <a:off x="8724900" y="365125"/>
-            <a:ext cx="2628900" cy="5811838"/>
+            <a:off x="7566124" y="218061"/>
+            <a:ext cx="2279749" cy="3470959"/>
           </a:xfrm>
         </p:spPr>
         <p:txBody>
@@ -515,7 +519,7 @@
               <a:rPr lang="en-US" smtClean="0"/>
               <a:t>Click to edit Master title style</a:t>
             </a:r>
-            <a:endParaRPr lang="en-US"/>
+            <a:endParaRPr lang="en-US" dirty="0"/>
           </a:p>
         </p:txBody>
       </p:sp>
@@ -531,8 +535,8 @@
         </p:nvSpPr>
         <p:spPr>
           <a:xfrm>
-            <a:off x="838200" y="365125"/>
-            <a:ext cx="7734300" cy="5811838"/>
+            <a:off x="726877" y="218061"/>
+            <a:ext cx="6707088" cy="3470959"/>
           </a:xfrm>
         </p:spPr>
         <p:txBody>
@@ -572,7 +576,7 @@
               <a:rPr lang="en-US" smtClean="0"/>
               <a:t>Fifth level</a:t>
             </a:r>
-            <a:endParaRPr lang="en-US"/>
+            <a:endParaRPr lang="en-US" dirty="0"/>
           </a:p>
         </p:txBody>
       </p:sp>
@@ -644,7 +648,7 @@
     </p:spTree>
     <p:extLst>
       <p:ext uri="{BB962C8B-B14F-4D97-AF65-F5344CB8AC3E}">
-        <p14:creationId xmlns:p14="http://schemas.microsoft.com/office/powerpoint/2010/main" val="2530236007"/>
+        <p14:creationId xmlns:p14="http://schemas.microsoft.com/office/powerpoint/2010/main" val="3332611573"/>
       </p:ext>
     </p:extLst>
   </p:cSld>
@@ -690,7 +694,7 @@
               <a:rPr lang="en-US" smtClean="0"/>
               <a:t>Click to edit Master title style</a:t>
             </a:r>
-            <a:endParaRPr lang="en-US"/>
+            <a:endParaRPr lang="en-US" dirty="0"/>
           </a:p>
         </p:txBody>
       </p:sp>
@@ -742,7 +746,7 @@
               <a:rPr lang="en-US" smtClean="0"/>
               <a:t>Fifth level</a:t>
             </a:r>
-            <a:endParaRPr lang="en-US"/>
+            <a:endParaRPr lang="en-US" dirty="0"/>
           </a:p>
         </p:txBody>
       </p:sp>
@@ -814,7 +818,7 @@
     </p:spTree>
     <p:extLst>
       <p:ext uri="{BB962C8B-B14F-4D97-AF65-F5344CB8AC3E}">
-        <p14:creationId xmlns:p14="http://schemas.microsoft.com/office/powerpoint/2010/main" val="943789385"/>
+        <p14:creationId xmlns:p14="http://schemas.microsoft.com/office/powerpoint/2010/main" val="145033441"/>
       </p:ext>
     </p:extLst>
   </p:cSld>
@@ -853,15 +857,15 @@
         </p:nvSpPr>
         <p:spPr>
           <a:xfrm>
-            <a:off x="831850" y="1709738"/>
-            <a:ext cx="10515600" cy="2852737"/>
+            <a:off x="721370" y="1021094"/>
+            <a:ext cx="9118997" cy="1703718"/>
           </a:xfrm>
         </p:spPr>
         <p:txBody>
           <a:bodyPr anchor="b"/>
           <a:lstStyle>
             <a:lvl1pPr>
-              <a:defRPr sz="6000"/>
+              <a:defRPr sz="3583"/>
             </a:lvl1pPr>
           </a:lstStyle>
           <a:p>
@@ -869,7 +873,7 @@
               <a:rPr lang="en-US" smtClean="0"/>
               <a:t>Click to edit Master title style</a:t>
             </a:r>
-            <a:endParaRPr lang="en-US"/>
+            <a:endParaRPr lang="en-US" dirty="0"/>
           </a:p>
         </p:txBody>
       </p:sp>
@@ -885,8 +889,8 @@
         </p:nvSpPr>
         <p:spPr>
           <a:xfrm>
-            <a:off x="831850" y="4589463"/>
-            <a:ext cx="10515600" cy="1500187"/>
+            <a:off x="721370" y="2740930"/>
+            <a:ext cx="9118997" cy="895945"/>
           </a:xfrm>
         </p:spPr>
         <p:txBody>
@@ -894,7 +898,7 @@
           <a:lstStyle>
             <a:lvl1pPr marL="0" indent="0">
               <a:buNone/>
-              <a:defRPr sz="2400">
+              <a:defRPr sz="1433">
                 <a:solidFill>
                   <a:schemeClr val="tx1">
                     <a:tint val="75000"/>
@@ -902,9 +906,9 @@
                 </a:solidFill>
               </a:defRPr>
             </a:lvl1pPr>
-            <a:lvl2pPr marL="457200" indent="0">
-              <a:buNone/>
-              <a:defRPr sz="2000">
+            <a:lvl2pPr marL="273040" indent="0">
+              <a:buNone/>
+              <a:defRPr sz="1194">
                 <a:solidFill>
                   <a:schemeClr val="tx1">
                     <a:tint val="75000"/>
@@ -912,9 +916,9 @@
                 </a:solidFill>
               </a:defRPr>
             </a:lvl2pPr>
-            <a:lvl3pPr marL="914400" indent="0">
-              <a:buNone/>
-              <a:defRPr sz="1800">
+            <a:lvl3pPr marL="546080" indent="0">
+              <a:buNone/>
+              <a:defRPr sz="1075">
                 <a:solidFill>
                   <a:schemeClr val="tx1">
                     <a:tint val="75000"/>
@@ -922,9 +926,9 @@
                 </a:solidFill>
               </a:defRPr>
             </a:lvl3pPr>
-            <a:lvl4pPr marL="1371600" indent="0">
-              <a:buNone/>
-              <a:defRPr sz="1600">
+            <a:lvl4pPr marL="819120" indent="0">
+              <a:buNone/>
+              <a:defRPr sz="956">
                 <a:solidFill>
                   <a:schemeClr val="tx1">
                     <a:tint val="75000"/>
@@ -932,9 +936,9 @@
                 </a:solidFill>
               </a:defRPr>
             </a:lvl4pPr>
-            <a:lvl5pPr marL="1828800" indent="0">
-              <a:buNone/>
-              <a:defRPr sz="1600">
+            <a:lvl5pPr marL="1092159" indent="0">
+              <a:buNone/>
+              <a:defRPr sz="956">
                 <a:solidFill>
                   <a:schemeClr val="tx1">
                     <a:tint val="75000"/>
@@ -942,9 +946,9 @@
                 </a:solidFill>
               </a:defRPr>
             </a:lvl5pPr>
-            <a:lvl6pPr marL="2286000" indent="0">
-              <a:buNone/>
-              <a:defRPr sz="1600">
+            <a:lvl6pPr marL="1365199" indent="0">
+              <a:buNone/>
+              <a:defRPr sz="956">
                 <a:solidFill>
                   <a:schemeClr val="tx1">
                     <a:tint val="75000"/>
@@ -952,9 +956,9 @@
                 </a:solidFill>
               </a:defRPr>
             </a:lvl6pPr>
-            <a:lvl7pPr marL="2743200" indent="0">
-              <a:buNone/>
-              <a:defRPr sz="1600">
+            <a:lvl7pPr marL="1638239" indent="0">
+              <a:buNone/>
+              <a:defRPr sz="956">
                 <a:solidFill>
                   <a:schemeClr val="tx1">
                     <a:tint val="75000"/>
@@ -962,9 +966,9 @@
                 </a:solidFill>
               </a:defRPr>
             </a:lvl7pPr>
-            <a:lvl8pPr marL="3200400" indent="0">
-              <a:buNone/>
-              <a:defRPr sz="1600">
+            <a:lvl8pPr marL="1911279" indent="0">
+              <a:buNone/>
+              <a:defRPr sz="956">
                 <a:solidFill>
                   <a:schemeClr val="tx1">
                     <a:tint val="75000"/>
@@ -972,9 +976,9 @@
                 </a:solidFill>
               </a:defRPr>
             </a:lvl8pPr>
-            <a:lvl9pPr marL="3657600" indent="0">
-              <a:buNone/>
-              <a:defRPr sz="1600">
+            <a:lvl9pPr marL="2184319" indent="0">
+              <a:buNone/>
+              <a:defRPr sz="956">
                 <a:solidFill>
                   <a:schemeClr val="tx1">
                     <a:tint val="75000"/>
@@ -1060,7 +1064,7 @@
     </p:spTree>
     <p:extLst>
       <p:ext uri="{BB962C8B-B14F-4D97-AF65-F5344CB8AC3E}">
-        <p14:creationId xmlns:p14="http://schemas.microsoft.com/office/powerpoint/2010/main" val="5681212"/>
+        <p14:creationId xmlns:p14="http://schemas.microsoft.com/office/powerpoint/2010/main" val="1843443440"/>
       </p:ext>
     </p:extLst>
   </p:cSld>
@@ -1106,7 +1110,7 @@
               <a:rPr lang="en-US" smtClean="0"/>
               <a:t>Click to edit Master title style</a:t>
             </a:r>
-            <a:endParaRPr lang="en-US"/>
+            <a:endParaRPr lang="en-US" dirty="0"/>
           </a:p>
         </p:txBody>
       </p:sp>
@@ -1122,8 +1126,8 @@
         </p:nvSpPr>
         <p:spPr>
           <a:xfrm>
-            <a:off x="838200" y="1825625"/>
-            <a:ext cx="5181600" cy="4351338"/>
+            <a:off x="726876" y="1090304"/>
+            <a:ext cx="4493419" cy="2598716"/>
           </a:xfrm>
         </p:spPr>
         <p:txBody>
@@ -1163,7 +1167,7 @@
               <a:rPr lang="en-US" smtClean="0"/>
               <a:t>Fifth level</a:t>
             </a:r>
-            <a:endParaRPr lang="en-US"/>
+            <a:endParaRPr lang="en-US" dirty="0"/>
           </a:p>
         </p:txBody>
       </p:sp>
@@ -1179,8 +1183,8 @@
         </p:nvSpPr>
         <p:spPr>
           <a:xfrm>
-            <a:off x="6172200" y="1825625"/>
-            <a:ext cx="5181600" cy="4351338"/>
+            <a:off x="5352455" y="1090304"/>
+            <a:ext cx="4493419" cy="2598716"/>
           </a:xfrm>
         </p:spPr>
         <p:txBody>
@@ -1220,7 +1224,7 @@
               <a:rPr lang="en-US" smtClean="0"/>
               <a:t>Fifth level</a:t>
             </a:r>
-            <a:endParaRPr lang="en-US"/>
+            <a:endParaRPr lang="en-US" dirty="0"/>
           </a:p>
         </p:txBody>
       </p:sp>
@@ -1292,7 +1296,7 @@
     </p:spTree>
     <p:extLst>
       <p:ext uri="{BB962C8B-B14F-4D97-AF65-F5344CB8AC3E}">
-        <p14:creationId xmlns:p14="http://schemas.microsoft.com/office/powerpoint/2010/main" val="2443210816"/>
+        <p14:creationId xmlns:p14="http://schemas.microsoft.com/office/powerpoint/2010/main" val="269032735"/>
       </p:ext>
     </p:extLst>
   </p:cSld>
@@ -1331,8 +1335,8 @@
         </p:nvSpPr>
         <p:spPr>
           <a:xfrm>
-            <a:off x="839788" y="365125"/>
-            <a:ext cx="10515600" cy="1325563"/>
+            <a:off x="728254" y="218061"/>
+            <a:ext cx="9118997" cy="791656"/>
           </a:xfrm>
         </p:spPr>
         <p:txBody>
@@ -1343,7 +1347,7 @@
               <a:rPr lang="en-US" smtClean="0"/>
               <a:t>Click to edit Master title style</a:t>
             </a:r>
-            <a:endParaRPr lang="en-US"/>
+            <a:endParaRPr lang="en-US" dirty="0"/>
           </a:p>
         </p:txBody>
       </p:sp>
@@ -1359,8 +1363,8 @@
         </p:nvSpPr>
         <p:spPr>
           <a:xfrm>
-            <a:off x="839788" y="1681163"/>
-            <a:ext cx="5157787" cy="823912"/>
+            <a:off x="728254" y="1004028"/>
+            <a:ext cx="4472768" cy="492059"/>
           </a:xfrm>
         </p:spPr>
         <p:txBody>
@@ -1368,39 +1372,39 @@
           <a:lstStyle>
             <a:lvl1pPr marL="0" indent="0">
               <a:buNone/>
-              <a:defRPr sz="2400" b="1"/>
+              <a:defRPr sz="1433" b="1"/>
             </a:lvl1pPr>
-            <a:lvl2pPr marL="457200" indent="0">
-              <a:buNone/>
-              <a:defRPr sz="2000" b="1"/>
+            <a:lvl2pPr marL="273040" indent="0">
+              <a:buNone/>
+              <a:defRPr sz="1194" b="1"/>
             </a:lvl2pPr>
-            <a:lvl3pPr marL="914400" indent="0">
-              <a:buNone/>
-              <a:defRPr sz="1800" b="1"/>
+            <a:lvl3pPr marL="546080" indent="0">
+              <a:buNone/>
+              <a:defRPr sz="1075" b="1"/>
             </a:lvl3pPr>
-            <a:lvl4pPr marL="1371600" indent="0">
-              <a:buNone/>
-              <a:defRPr sz="1600" b="1"/>
+            <a:lvl4pPr marL="819120" indent="0">
+              <a:buNone/>
+              <a:defRPr sz="956" b="1"/>
             </a:lvl4pPr>
-            <a:lvl5pPr marL="1828800" indent="0">
-              <a:buNone/>
-              <a:defRPr sz="1600" b="1"/>
+            <a:lvl5pPr marL="1092159" indent="0">
+              <a:buNone/>
+              <a:defRPr sz="956" b="1"/>
             </a:lvl5pPr>
-            <a:lvl6pPr marL="2286000" indent="0">
-              <a:buNone/>
-              <a:defRPr sz="1600" b="1"/>
+            <a:lvl6pPr marL="1365199" indent="0">
+              <a:buNone/>
+              <a:defRPr sz="956" b="1"/>
             </a:lvl6pPr>
-            <a:lvl7pPr marL="2743200" indent="0">
-              <a:buNone/>
-              <a:defRPr sz="1600" b="1"/>
+            <a:lvl7pPr marL="1638239" indent="0">
+              <a:buNone/>
+              <a:defRPr sz="956" b="1"/>
             </a:lvl7pPr>
-            <a:lvl8pPr marL="3200400" indent="0">
-              <a:buNone/>
-              <a:defRPr sz="1600" b="1"/>
+            <a:lvl8pPr marL="1911279" indent="0">
+              <a:buNone/>
+              <a:defRPr sz="956" b="1"/>
             </a:lvl8pPr>
-            <a:lvl9pPr marL="3657600" indent="0">
-              <a:buNone/>
-              <a:defRPr sz="1600" b="1"/>
+            <a:lvl9pPr marL="2184319" indent="0">
+              <a:buNone/>
+              <a:defRPr sz="956" b="1"/>
             </a:lvl9pPr>
           </a:lstStyle>
           <a:p>
@@ -1424,8 +1428,8 @@
         </p:nvSpPr>
         <p:spPr>
           <a:xfrm>
-            <a:off x="839788" y="2505075"/>
-            <a:ext cx="5157787" cy="3684588"/>
+            <a:off x="728254" y="1496086"/>
+            <a:ext cx="4472768" cy="2200518"/>
           </a:xfrm>
         </p:spPr>
         <p:txBody>
@@ -1465,7 +1469,7 @@
               <a:rPr lang="en-US" smtClean="0"/>
               <a:t>Fifth level</a:t>
             </a:r>
-            <a:endParaRPr lang="en-US"/>
+            <a:endParaRPr lang="en-US" dirty="0"/>
           </a:p>
         </p:txBody>
       </p:sp>
@@ -1481,8 +1485,8 @@
         </p:nvSpPr>
         <p:spPr>
           <a:xfrm>
-            <a:off x="6172200" y="1681163"/>
-            <a:ext cx="5183188" cy="823912"/>
+            <a:off x="5352455" y="1004028"/>
+            <a:ext cx="4494796" cy="492059"/>
           </a:xfrm>
         </p:spPr>
         <p:txBody>
@@ -1490,39 +1494,39 @@
           <a:lstStyle>
             <a:lvl1pPr marL="0" indent="0">
               <a:buNone/>
-              <a:defRPr sz="2400" b="1"/>
+              <a:defRPr sz="1433" b="1"/>
             </a:lvl1pPr>
-            <a:lvl2pPr marL="457200" indent="0">
-              <a:buNone/>
-              <a:defRPr sz="2000" b="1"/>
+            <a:lvl2pPr marL="273040" indent="0">
+              <a:buNone/>
+              <a:defRPr sz="1194" b="1"/>
             </a:lvl2pPr>
-            <a:lvl3pPr marL="914400" indent="0">
-              <a:buNone/>
-              <a:defRPr sz="1800" b="1"/>
+            <a:lvl3pPr marL="546080" indent="0">
+              <a:buNone/>
+              <a:defRPr sz="1075" b="1"/>
             </a:lvl3pPr>
-            <a:lvl4pPr marL="1371600" indent="0">
-              <a:buNone/>
-              <a:defRPr sz="1600" b="1"/>
+            <a:lvl4pPr marL="819120" indent="0">
+              <a:buNone/>
+              <a:defRPr sz="956" b="1"/>
             </a:lvl4pPr>
-            <a:lvl5pPr marL="1828800" indent="0">
-              <a:buNone/>
-              <a:defRPr sz="1600" b="1"/>
+            <a:lvl5pPr marL="1092159" indent="0">
+              <a:buNone/>
+              <a:defRPr sz="956" b="1"/>
             </a:lvl5pPr>
-            <a:lvl6pPr marL="2286000" indent="0">
-              <a:buNone/>
-              <a:defRPr sz="1600" b="1"/>
+            <a:lvl6pPr marL="1365199" indent="0">
+              <a:buNone/>
+              <a:defRPr sz="956" b="1"/>
             </a:lvl6pPr>
-            <a:lvl7pPr marL="2743200" indent="0">
-              <a:buNone/>
-              <a:defRPr sz="1600" b="1"/>
+            <a:lvl7pPr marL="1638239" indent="0">
+              <a:buNone/>
+              <a:defRPr sz="956" b="1"/>
             </a:lvl7pPr>
-            <a:lvl8pPr marL="3200400" indent="0">
-              <a:buNone/>
-              <a:defRPr sz="1600" b="1"/>
+            <a:lvl8pPr marL="1911279" indent="0">
+              <a:buNone/>
+              <a:defRPr sz="956" b="1"/>
             </a:lvl8pPr>
-            <a:lvl9pPr marL="3657600" indent="0">
-              <a:buNone/>
-              <a:defRPr sz="1600" b="1"/>
+            <a:lvl9pPr marL="2184319" indent="0">
+              <a:buNone/>
+              <a:defRPr sz="956" b="1"/>
             </a:lvl9pPr>
           </a:lstStyle>
           <a:p>
@@ -1546,8 +1550,8 @@
         </p:nvSpPr>
         <p:spPr>
           <a:xfrm>
-            <a:off x="6172200" y="2505075"/>
-            <a:ext cx="5183188" cy="3684588"/>
+            <a:off x="5352455" y="1496086"/>
+            <a:ext cx="4494796" cy="2200518"/>
           </a:xfrm>
         </p:spPr>
         <p:txBody>
@@ -1587,7 +1591,7 @@
               <a:rPr lang="en-US" smtClean="0"/>
               <a:t>Fifth level</a:t>
             </a:r>
-            <a:endParaRPr lang="en-US"/>
+            <a:endParaRPr lang="en-US" dirty="0"/>
           </a:p>
         </p:txBody>
       </p:sp>
@@ -1659,7 +1663,7 @@
     </p:spTree>
     <p:extLst>
       <p:ext uri="{BB962C8B-B14F-4D97-AF65-F5344CB8AC3E}">
-        <p14:creationId xmlns:p14="http://schemas.microsoft.com/office/powerpoint/2010/main" val="187681039"/>
+        <p14:creationId xmlns:p14="http://schemas.microsoft.com/office/powerpoint/2010/main" val="663982515"/>
       </p:ext>
     </p:extLst>
   </p:cSld>
@@ -1705,7 +1709,7 @@
               <a:rPr lang="en-US" smtClean="0"/>
               <a:t>Click to edit Master title style</a:t>
             </a:r>
-            <a:endParaRPr lang="en-US"/>
+            <a:endParaRPr lang="en-US" dirty="0"/>
           </a:p>
         </p:txBody>
       </p:sp>
@@ -1777,7 +1781,7 @@
     </p:spTree>
     <p:extLst>
       <p:ext uri="{BB962C8B-B14F-4D97-AF65-F5344CB8AC3E}">
-        <p14:creationId xmlns:p14="http://schemas.microsoft.com/office/powerpoint/2010/main" val="156383831"/>
+        <p14:creationId xmlns:p14="http://schemas.microsoft.com/office/powerpoint/2010/main" val="789313342"/>
       </p:ext>
     </p:extLst>
   </p:cSld>
@@ -1872,7 +1876,7 @@
     </p:spTree>
     <p:extLst>
       <p:ext uri="{BB962C8B-B14F-4D97-AF65-F5344CB8AC3E}">
-        <p14:creationId xmlns:p14="http://schemas.microsoft.com/office/powerpoint/2010/main" val="829697965"/>
+        <p14:creationId xmlns:p14="http://schemas.microsoft.com/office/powerpoint/2010/main" val="2854341562"/>
       </p:ext>
     </p:extLst>
   </p:cSld>
@@ -1911,15 +1915,15 @@
         </p:nvSpPr>
         <p:spPr>
           <a:xfrm>
-            <a:off x="839788" y="457200"/>
-            <a:ext cx="3932237" cy="1600200"/>
+            <a:off x="728254" y="273050"/>
+            <a:ext cx="3409987" cy="955675"/>
           </a:xfrm>
         </p:spPr>
         <p:txBody>
           <a:bodyPr anchor="b"/>
           <a:lstStyle>
             <a:lvl1pPr>
-              <a:defRPr sz="3200"/>
+              <a:defRPr sz="1911"/>
             </a:lvl1pPr>
           </a:lstStyle>
           <a:p>
@@ -1927,7 +1931,7 @@
               <a:rPr lang="en-US" smtClean="0"/>
               <a:t>Click to edit Master title style</a:t>
             </a:r>
-            <a:endParaRPr lang="en-US"/>
+            <a:endParaRPr lang="en-US" dirty="0"/>
           </a:p>
         </p:txBody>
       </p:sp>
@@ -1943,39 +1947,39 @@
         </p:nvSpPr>
         <p:spPr>
           <a:xfrm>
-            <a:off x="5183188" y="987425"/>
-            <a:ext cx="6172200" cy="4873625"/>
+            <a:off x="4494796" y="589713"/>
+            <a:ext cx="5352455" cy="2910637"/>
           </a:xfrm>
         </p:spPr>
         <p:txBody>
           <a:bodyPr/>
           <a:lstStyle>
             <a:lvl1pPr>
-              <a:defRPr sz="3200"/>
+              <a:defRPr sz="1911"/>
             </a:lvl1pPr>
             <a:lvl2pPr>
-              <a:defRPr sz="2800"/>
+              <a:defRPr sz="1672"/>
             </a:lvl2pPr>
             <a:lvl3pPr>
-              <a:defRPr sz="2400"/>
+              <a:defRPr sz="1433"/>
             </a:lvl3pPr>
             <a:lvl4pPr>
-              <a:defRPr sz="2000"/>
+              <a:defRPr sz="1194"/>
             </a:lvl4pPr>
             <a:lvl5pPr>
-              <a:defRPr sz="2000"/>
+              <a:defRPr sz="1194"/>
             </a:lvl5pPr>
             <a:lvl6pPr>
-              <a:defRPr sz="2000"/>
+              <a:defRPr sz="1194"/>
             </a:lvl6pPr>
             <a:lvl7pPr>
-              <a:defRPr sz="2000"/>
+              <a:defRPr sz="1194"/>
             </a:lvl7pPr>
             <a:lvl8pPr>
-              <a:defRPr sz="2000"/>
+              <a:defRPr sz="1194"/>
             </a:lvl8pPr>
             <a:lvl9pPr>
-              <a:defRPr sz="2000"/>
+              <a:defRPr sz="1194"/>
             </a:lvl9pPr>
           </a:lstStyle>
           <a:p>
@@ -2012,7 +2016,7 @@
               <a:rPr lang="en-US" smtClean="0"/>
               <a:t>Fifth level</a:t>
             </a:r>
-            <a:endParaRPr lang="en-US"/>
+            <a:endParaRPr lang="en-US" dirty="0"/>
           </a:p>
         </p:txBody>
       </p:sp>
@@ -2028,8 +2032,8 @@
         </p:nvSpPr>
         <p:spPr>
           <a:xfrm>
-            <a:off x="839788" y="2057400"/>
-            <a:ext cx="3932237" cy="3811588"/>
+            <a:off x="728254" y="1228725"/>
+            <a:ext cx="3409987" cy="2276365"/>
           </a:xfrm>
         </p:spPr>
         <p:txBody>
@@ -2037,39 +2041,39 @@
           <a:lstStyle>
             <a:lvl1pPr marL="0" indent="0">
               <a:buNone/>
-              <a:defRPr sz="1600"/>
+              <a:defRPr sz="956"/>
             </a:lvl1pPr>
-            <a:lvl2pPr marL="457200" indent="0">
-              <a:buNone/>
-              <a:defRPr sz="1400"/>
+            <a:lvl2pPr marL="273040" indent="0">
+              <a:buNone/>
+              <a:defRPr sz="836"/>
             </a:lvl2pPr>
-            <a:lvl3pPr marL="914400" indent="0">
-              <a:buNone/>
-              <a:defRPr sz="1200"/>
+            <a:lvl3pPr marL="546080" indent="0">
+              <a:buNone/>
+              <a:defRPr sz="717"/>
             </a:lvl3pPr>
-            <a:lvl4pPr marL="1371600" indent="0">
-              <a:buNone/>
-              <a:defRPr sz="1000"/>
+            <a:lvl4pPr marL="819120" indent="0">
+              <a:buNone/>
+              <a:defRPr sz="597"/>
             </a:lvl4pPr>
-            <a:lvl5pPr marL="1828800" indent="0">
-              <a:buNone/>
-              <a:defRPr sz="1000"/>
+            <a:lvl5pPr marL="1092159" indent="0">
+              <a:buNone/>
+              <a:defRPr sz="597"/>
             </a:lvl5pPr>
-            <a:lvl6pPr marL="2286000" indent="0">
-              <a:buNone/>
-              <a:defRPr sz="1000"/>
+            <a:lvl6pPr marL="1365199" indent="0">
+              <a:buNone/>
+              <a:defRPr sz="597"/>
             </a:lvl6pPr>
-            <a:lvl7pPr marL="2743200" indent="0">
-              <a:buNone/>
-              <a:defRPr sz="1000"/>
+            <a:lvl7pPr marL="1638239" indent="0">
+              <a:buNone/>
+              <a:defRPr sz="597"/>
             </a:lvl7pPr>
-            <a:lvl8pPr marL="3200400" indent="0">
-              <a:buNone/>
-              <a:defRPr sz="1000"/>
+            <a:lvl8pPr marL="1911279" indent="0">
+              <a:buNone/>
+              <a:defRPr sz="597"/>
             </a:lvl8pPr>
-            <a:lvl9pPr marL="3657600" indent="0">
-              <a:buNone/>
-              <a:defRPr sz="1000"/>
+            <a:lvl9pPr marL="2184319" indent="0">
+              <a:buNone/>
+              <a:defRPr sz="597"/>
             </a:lvl9pPr>
           </a:lstStyle>
           <a:p>
@@ -2149,7 +2153,7 @@
     </p:spTree>
     <p:extLst>
       <p:ext uri="{BB962C8B-B14F-4D97-AF65-F5344CB8AC3E}">
-        <p14:creationId xmlns:p14="http://schemas.microsoft.com/office/powerpoint/2010/main" val="4139570631"/>
+        <p14:creationId xmlns:p14="http://schemas.microsoft.com/office/powerpoint/2010/main" val="630470442"/>
       </p:ext>
     </p:extLst>
   </p:cSld>
@@ -2188,15 +2192,15 @@
         </p:nvSpPr>
         <p:spPr>
           <a:xfrm>
-            <a:off x="839788" y="457200"/>
-            <a:ext cx="3932237" cy="1600200"/>
+            <a:off x="728254" y="273050"/>
+            <a:ext cx="3409987" cy="955675"/>
           </a:xfrm>
         </p:spPr>
         <p:txBody>
           <a:bodyPr anchor="b"/>
           <a:lstStyle>
             <a:lvl1pPr>
-              <a:defRPr sz="3200"/>
+              <a:defRPr sz="1911"/>
             </a:lvl1pPr>
           </a:lstStyle>
           <a:p>
@@ -2204,7 +2208,7 @@
               <a:rPr lang="en-US" smtClean="0"/>
               <a:t>Click to edit Master title style</a:t>
             </a:r>
-            <a:endParaRPr lang="en-US"/>
+            <a:endParaRPr lang="en-US" dirty="0"/>
           </a:p>
         </p:txBody>
       </p:sp>
@@ -2212,7 +2216,7 @@
         <p:nvSpPr>
           <p:cNvPr id="3" name="Picture Placeholder 2"/>
           <p:cNvSpPr>
-            <a:spLocks noGrp="1"/>
+            <a:spLocks noGrp="1" noChangeAspect="1"/>
           </p:cNvSpPr>
           <p:nvPr>
             <p:ph type="pic" idx="1"/>
@@ -2220,52 +2224,56 @@
         </p:nvSpPr>
         <p:spPr>
           <a:xfrm>
-            <a:off x="5183188" y="987425"/>
-            <a:ext cx="6172200" cy="4873625"/>
-          </a:xfrm>
-        </p:spPr>
-        <p:txBody>
-          <a:bodyPr/>
+            <a:off x="4494796" y="589713"/>
+            <a:ext cx="5352455" cy="2910637"/>
+          </a:xfrm>
+        </p:spPr>
+        <p:txBody>
+          <a:bodyPr anchor="t"/>
           <a:lstStyle>
             <a:lvl1pPr marL="0" indent="0">
               <a:buNone/>
-              <a:defRPr sz="3200"/>
+              <a:defRPr sz="1911"/>
             </a:lvl1pPr>
-            <a:lvl2pPr marL="457200" indent="0">
-              <a:buNone/>
-              <a:defRPr sz="2800"/>
+            <a:lvl2pPr marL="273040" indent="0">
+              <a:buNone/>
+              <a:defRPr sz="1672"/>
             </a:lvl2pPr>
-            <a:lvl3pPr marL="914400" indent="0">
-              <a:buNone/>
-              <a:defRPr sz="2400"/>
+            <a:lvl3pPr marL="546080" indent="0">
+              <a:buNone/>
+              <a:defRPr sz="1433"/>
             </a:lvl3pPr>
-            <a:lvl4pPr marL="1371600" indent="0">
-              <a:buNone/>
-              <a:defRPr sz="2000"/>
+            <a:lvl4pPr marL="819120" indent="0">
+              <a:buNone/>
+              <a:defRPr sz="1194"/>
             </a:lvl4pPr>
-            <a:lvl5pPr marL="1828800" indent="0">
-              <a:buNone/>
-              <a:defRPr sz="2000"/>
+            <a:lvl5pPr marL="1092159" indent="0">
+              <a:buNone/>
+              <a:defRPr sz="1194"/>
             </a:lvl5pPr>
-            <a:lvl6pPr marL="2286000" indent="0">
-              <a:buNone/>
-              <a:defRPr sz="2000"/>
+            <a:lvl6pPr marL="1365199" indent="0">
+              <a:buNone/>
+              <a:defRPr sz="1194"/>
             </a:lvl6pPr>
-            <a:lvl7pPr marL="2743200" indent="0">
-              <a:buNone/>
-              <a:defRPr sz="2000"/>
+            <a:lvl7pPr marL="1638239" indent="0">
+              <a:buNone/>
+              <a:defRPr sz="1194"/>
             </a:lvl7pPr>
-            <a:lvl8pPr marL="3200400" indent="0">
-              <a:buNone/>
-              <a:defRPr sz="2000"/>
+            <a:lvl8pPr marL="1911279" indent="0">
+              <a:buNone/>
+              <a:defRPr sz="1194"/>
             </a:lvl8pPr>
-            <a:lvl9pPr marL="3657600" indent="0">
-              <a:buNone/>
-              <a:defRPr sz="2000"/>
+            <a:lvl9pPr marL="2184319" indent="0">
+              <a:buNone/>
+              <a:defRPr sz="1194"/>
             </a:lvl9pPr>
           </a:lstStyle>
           <a:p>
-            <a:endParaRPr lang="en-US"/>
+            <a:r>
+              <a:rPr lang="en-US" smtClean="0"/>
+              <a:t>Click icon to add picture</a:t>
+            </a:r>
+            <a:endParaRPr lang="en-US" dirty="0"/>
           </a:p>
         </p:txBody>
       </p:sp>
@@ -2281,8 +2289,8 @@
         </p:nvSpPr>
         <p:spPr>
           <a:xfrm>
-            <a:off x="839788" y="2057400"/>
-            <a:ext cx="3932237" cy="3811588"/>
+            <a:off x="728254" y="1228725"/>
+            <a:ext cx="3409987" cy="2276365"/>
           </a:xfrm>
         </p:spPr>
         <p:txBody>
@@ -2290,39 +2298,39 @@
           <a:lstStyle>
             <a:lvl1pPr marL="0" indent="0">
               <a:buNone/>
-              <a:defRPr sz="1600"/>
+              <a:defRPr sz="956"/>
             </a:lvl1pPr>
-            <a:lvl2pPr marL="457200" indent="0">
-              <a:buNone/>
-              <a:defRPr sz="1400"/>
+            <a:lvl2pPr marL="273040" indent="0">
+              <a:buNone/>
+              <a:defRPr sz="836"/>
             </a:lvl2pPr>
-            <a:lvl3pPr marL="914400" indent="0">
-              <a:buNone/>
-              <a:defRPr sz="1200"/>
+            <a:lvl3pPr marL="546080" indent="0">
+              <a:buNone/>
+              <a:defRPr sz="717"/>
             </a:lvl3pPr>
-            <a:lvl4pPr marL="1371600" indent="0">
-              <a:buNone/>
-              <a:defRPr sz="1000"/>
+            <a:lvl4pPr marL="819120" indent="0">
+              <a:buNone/>
+              <a:defRPr sz="597"/>
             </a:lvl4pPr>
-            <a:lvl5pPr marL="1828800" indent="0">
-              <a:buNone/>
-              <a:defRPr sz="1000"/>
+            <a:lvl5pPr marL="1092159" indent="0">
+              <a:buNone/>
+              <a:defRPr sz="597"/>
             </a:lvl5pPr>
-            <a:lvl6pPr marL="2286000" indent="0">
-              <a:buNone/>
-              <a:defRPr sz="1000"/>
+            <a:lvl6pPr marL="1365199" indent="0">
+              <a:buNone/>
+              <a:defRPr sz="597"/>
             </a:lvl6pPr>
-            <a:lvl7pPr marL="2743200" indent="0">
-              <a:buNone/>
-              <a:defRPr sz="1000"/>
+            <a:lvl7pPr marL="1638239" indent="0">
+              <a:buNone/>
+              <a:defRPr sz="597"/>
             </a:lvl7pPr>
-            <a:lvl8pPr marL="3200400" indent="0">
-              <a:buNone/>
-              <a:defRPr sz="1000"/>
+            <a:lvl8pPr marL="1911279" indent="0">
+              <a:buNone/>
+              <a:defRPr sz="597"/>
             </a:lvl8pPr>
-            <a:lvl9pPr marL="3657600" indent="0">
-              <a:buNone/>
-              <a:defRPr sz="1000"/>
+            <a:lvl9pPr marL="2184319" indent="0">
+              <a:buNone/>
+              <a:defRPr sz="597"/>
             </a:lvl9pPr>
           </a:lstStyle>
           <a:p>
@@ -2402,7 +2410,7 @@
     </p:spTree>
     <p:extLst>
       <p:ext uri="{BB962C8B-B14F-4D97-AF65-F5344CB8AC3E}">
-        <p14:creationId xmlns:p14="http://schemas.microsoft.com/office/powerpoint/2010/main" val="3885218829"/>
+        <p14:creationId xmlns:p14="http://schemas.microsoft.com/office/powerpoint/2010/main" val="1084380198"/>
       </p:ext>
     </p:extLst>
   </p:cSld>
@@ -2446,8 +2454,8 @@
         </p:nvSpPr>
         <p:spPr>
           <a:xfrm>
-            <a:off x="838200" y="365125"/>
-            <a:ext cx="10515600" cy="1325563"/>
+            <a:off x="726877" y="218061"/>
+            <a:ext cx="9118997" cy="791656"/>
           </a:xfrm>
           <a:prstGeom prst="rect">
             <a:avLst/>
@@ -2463,7 +2471,7 @@
               <a:rPr lang="en-US" smtClean="0"/>
               <a:t>Click to edit Master title style</a:t>
             </a:r>
-            <a:endParaRPr lang="en-US"/>
+            <a:endParaRPr lang="en-US" dirty="0"/>
           </a:p>
         </p:txBody>
       </p:sp>
@@ -2479,8 +2487,8 @@
         </p:nvSpPr>
         <p:spPr>
           <a:xfrm>
-            <a:off x="838200" y="1825625"/>
-            <a:ext cx="10515600" cy="4351338"/>
+            <a:off x="726877" y="1090304"/>
+            <a:ext cx="9118997" cy="2598716"/>
           </a:xfrm>
           <a:prstGeom prst="rect">
             <a:avLst/>
@@ -2525,7 +2533,7 @@
               <a:rPr lang="en-US" smtClean="0"/>
               <a:t>Fifth level</a:t>
             </a:r>
-            <a:endParaRPr lang="en-US"/>
+            <a:endParaRPr lang="en-US" dirty="0"/>
           </a:p>
         </p:txBody>
       </p:sp>
@@ -2541,8 +2549,8 @@
         </p:nvSpPr>
         <p:spPr>
           <a:xfrm>
-            <a:off x="838200" y="6356350"/>
-            <a:ext cx="2743200" cy="365125"/>
+            <a:off x="726876" y="3796154"/>
+            <a:ext cx="2378869" cy="218061"/>
           </a:xfrm>
           <a:prstGeom prst="rect">
             <a:avLst/>
@@ -2552,7 +2560,7 @@
           <a:bodyPr vert="horz" lIns="91440" tIns="45720" rIns="91440" bIns="45720" rtlCol="0" anchor="ctr"/>
           <a:lstStyle>
             <a:lvl1pPr algn="l">
-              <a:defRPr sz="1200">
+              <a:defRPr sz="717">
                 <a:solidFill>
                   <a:schemeClr val="tx1">
                     <a:tint val="75000"/>
@@ -2582,8 +2590,8 @@
         </p:nvSpPr>
         <p:spPr>
           <a:xfrm>
-            <a:off x="4038600" y="6356350"/>
-            <a:ext cx="4114800" cy="365125"/>
+            <a:off x="3502224" y="3796154"/>
+            <a:ext cx="3568303" cy="218061"/>
           </a:xfrm>
           <a:prstGeom prst="rect">
             <a:avLst/>
@@ -2593,7 +2601,7 @@
           <a:bodyPr vert="horz" lIns="91440" tIns="45720" rIns="91440" bIns="45720" rtlCol="0" anchor="ctr"/>
           <a:lstStyle>
             <a:lvl1pPr algn="ctr">
-              <a:defRPr sz="1200">
+              <a:defRPr sz="717">
                 <a:solidFill>
                   <a:schemeClr val="tx1">
                     <a:tint val="75000"/>
@@ -2619,8 +2627,8 @@
         </p:nvSpPr>
         <p:spPr>
           <a:xfrm>
-            <a:off x="8610600" y="6356350"/>
-            <a:ext cx="2743200" cy="365125"/>
+            <a:off x="7467005" y="3796154"/>
+            <a:ext cx="2378869" cy="218061"/>
           </a:xfrm>
           <a:prstGeom prst="rect">
             <a:avLst/>
@@ -2630,7 +2638,7 @@
           <a:bodyPr vert="horz" lIns="91440" tIns="45720" rIns="91440" bIns="45720" rtlCol="0" anchor="ctr"/>
           <a:lstStyle>
             <a:lvl1pPr algn="r">
-              <a:defRPr sz="1200">
+              <a:defRPr sz="717">
                 <a:solidFill>
                   <a:schemeClr val="tx1">
                     <a:tint val="75000"/>
@@ -2651,27 +2659,27 @@
     </p:spTree>
     <p:extLst>
       <p:ext uri="{BB962C8B-B14F-4D97-AF65-F5344CB8AC3E}">
-        <p14:creationId xmlns:p14="http://schemas.microsoft.com/office/powerpoint/2010/main" val="286671379"/>
+        <p14:creationId xmlns:p14="http://schemas.microsoft.com/office/powerpoint/2010/main" val="872022993"/>
       </p:ext>
     </p:extLst>
   </p:cSld>
   <p:clrMap bg1="lt1" tx1="dk1" bg2="lt2" tx2="dk2" accent1="accent1" accent2="accent2" accent3="accent3" accent4="accent4" accent5="accent5" accent6="accent6" hlink="hlink" folHlink="folHlink"/>
   <p:sldLayoutIdLst>
-    <p:sldLayoutId id="2147483649" r:id="rId1"/>
-    <p:sldLayoutId id="2147483650" r:id="rId2"/>
-    <p:sldLayoutId id="2147483651" r:id="rId3"/>
-    <p:sldLayoutId id="2147483652" r:id="rId4"/>
-    <p:sldLayoutId id="2147483653" r:id="rId5"/>
-    <p:sldLayoutId id="2147483654" r:id="rId6"/>
-    <p:sldLayoutId id="2147483655" r:id="rId7"/>
-    <p:sldLayoutId id="2147483656" r:id="rId8"/>
-    <p:sldLayoutId id="2147483657" r:id="rId9"/>
-    <p:sldLayoutId id="2147483658" r:id="rId10"/>
-    <p:sldLayoutId id="2147483659" r:id="rId11"/>
+    <p:sldLayoutId id="2147483661" r:id="rId1"/>
+    <p:sldLayoutId id="2147483662" r:id="rId2"/>
+    <p:sldLayoutId id="2147483663" r:id="rId3"/>
+    <p:sldLayoutId id="2147483664" r:id="rId4"/>
+    <p:sldLayoutId id="2147483665" r:id="rId5"/>
+    <p:sldLayoutId id="2147483666" r:id="rId6"/>
+    <p:sldLayoutId id="2147483667" r:id="rId7"/>
+    <p:sldLayoutId id="2147483668" r:id="rId8"/>
+    <p:sldLayoutId id="2147483669" r:id="rId9"/>
+    <p:sldLayoutId id="2147483670" r:id="rId10"/>
+    <p:sldLayoutId id="2147483671" r:id="rId11"/>
   </p:sldLayoutIdLst>
   <p:txStyles>
     <p:titleStyle>
-      <a:lvl1pPr algn="l" defTabSz="914400" rtl="0" eaLnBrk="1" latinLnBrk="0" hangingPunct="1">
+      <a:lvl1pPr algn="l" defTabSz="546080" rtl="0" eaLnBrk="1" latinLnBrk="0" hangingPunct="1">
         <a:lnSpc>
           <a:spcPct val="90000"/>
         </a:lnSpc>
@@ -2679,7 +2687,7 @@
           <a:spcPct val="0"/>
         </a:spcBef>
         <a:buNone/>
-        <a:defRPr sz="4400" kern="1200">
+        <a:defRPr sz="2628" kern="1200">
           <a:solidFill>
             <a:schemeClr val="tx1"/>
           </a:solidFill>
@@ -2690,16 +2698,16 @@
       </a:lvl1pPr>
     </p:titleStyle>
     <p:bodyStyle>
-      <a:lvl1pPr marL="228600" indent="-228600" algn="l" defTabSz="914400" rtl="0" eaLnBrk="1" latinLnBrk="0" hangingPunct="1">
+      <a:lvl1pPr marL="136520" indent="-136520" algn="l" defTabSz="546080" rtl="0" eaLnBrk="1" latinLnBrk="0" hangingPunct="1">
         <a:lnSpc>
           <a:spcPct val="90000"/>
         </a:lnSpc>
         <a:spcBef>
-          <a:spcPts val="1000"/>
+          <a:spcPts val="597"/>
         </a:spcBef>
         <a:buFont typeface="Arial" panose="020B0604020202020204" pitchFamily="34" charset="0"/>
         <a:buChar char="•"/>
-        <a:defRPr sz="2800" kern="1200">
+        <a:defRPr sz="1672" kern="1200">
           <a:solidFill>
             <a:schemeClr val="tx1"/>
           </a:solidFill>
@@ -2708,16 +2716,16 @@
           <a:cs typeface="+mn-cs"/>
         </a:defRPr>
       </a:lvl1pPr>
-      <a:lvl2pPr marL="685800" indent="-228600" algn="l" defTabSz="914400" rtl="0" eaLnBrk="1" latinLnBrk="0" hangingPunct="1">
+      <a:lvl2pPr marL="409560" indent="-136520" algn="l" defTabSz="546080" rtl="0" eaLnBrk="1" latinLnBrk="0" hangingPunct="1">
         <a:lnSpc>
           <a:spcPct val="90000"/>
         </a:lnSpc>
         <a:spcBef>
-          <a:spcPts val="500"/>
+          <a:spcPts val="299"/>
         </a:spcBef>
         <a:buFont typeface="Arial" panose="020B0604020202020204" pitchFamily="34" charset="0"/>
         <a:buChar char="•"/>
-        <a:defRPr sz="2400" kern="1200">
+        <a:defRPr sz="1433" kern="1200">
           <a:solidFill>
             <a:schemeClr val="tx1"/>
           </a:solidFill>
@@ -2726,16 +2734,16 @@
           <a:cs typeface="+mn-cs"/>
         </a:defRPr>
       </a:lvl2pPr>
-      <a:lvl3pPr marL="1143000" indent="-228600" algn="l" defTabSz="914400" rtl="0" eaLnBrk="1" latinLnBrk="0" hangingPunct="1">
+      <a:lvl3pPr marL="682600" indent="-136520" algn="l" defTabSz="546080" rtl="0" eaLnBrk="1" latinLnBrk="0" hangingPunct="1">
         <a:lnSpc>
           <a:spcPct val="90000"/>
         </a:lnSpc>
         <a:spcBef>
-          <a:spcPts val="500"/>
+          <a:spcPts val="299"/>
         </a:spcBef>
         <a:buFont typeface="Arial" panose="020B0604020202020204" pitchFamily="34" charset="0"/>
         <a:buChar char="•"/>
-        <a:defRPr sz="2000" kern="1200">
+        <a:defRPr sz="1194" kern="1200">
           <a:solidFill>
             <a:schemeClr val="tx1"/>
           </a:solidFill>
@@ -2744,16 +2752,16 @@
           <a:cs typeface="+mn-cs"/>
         </a:defRPr>
       </a:lvl3pPr>
-      <a:lvl4pPr marL="1600200" indent="-228600" algn="l" defTabSz="914400" rtl="0" eaLnBrk="1" latinLnBrk="0" hangingPunct="1">
+      <a:lvl4pPr marL="955639" indent="-136520" algn="l" defTabSz="546080" rtl="0" eaLnBrk="1" latinLnBrk="0" hangingPunct="1">
         <a:lnSpc>
           <a:spcPct val="90000"/>
         </a:lnSpc>
         <a:spcBef>
-          <a:spcPts val="500"/>
+          <a:spcPts val="299"/>
         </a:spcBef>
         <a:buFont typeface="Arial" panose="020B0604020202020204" pitchFamily="34" charset="0"/>
         <a:buChar char="•"/>
-        <a:defRPr sz="1800" kern="1200">
+        <a:defRPr sz="1075" kern="1200">
           <a:solidFill>
             <a:schemeClr val="tx1"/>
           </a:solidFill>
@@ -2762,16 +2770,16 @@
           <a:cs typeface="+mn-cs"/>
         </a:defRPr>
       </a:lvl4pPr>
-      <a:lvl5pPr marL="2057400" indent="-228600" algn="l" defTabSz="914400" rtl="0" eaLnBrk="1" latinLnBrk="0" hangingPunct="1">
+      <a:lvl5pPr marL="1228679" indent="-136520" algn="l" defTabSz="546080" rtl="0" eaLnBrk="1" latinLnBrk="0" hangingPunct="1">
         <a:lnSpc>
           <a:spcPct val="90000"/>
         </a:lnSpc>
         <a:spcBef>
-          <a:spcPts val="500"/>
+          <a:spcPts val="299"/>
         </a:spcBef>
         <a:buFont typeface="Arial" panose="020B0604020202020204" pitchFamily="34" charset="0"/>
         <a:buChar char="•"/>
-        <a:defRPr sz="1800" kern="1200">
+        <a:defRPr sz="1075" kern="1200">
           <a:solidFill>
             <a:schemeClr val="tx1"/>
           </a:solidFill>
@@ -2780,16 +2788,16 @@
           <a:cs typeface="+mn-cs"/>
         </a:defRPr>
       </a:lvl5pPr>
-      <a:lvl6pPr marL="2514600" indent="-228600" algn="l" defTabSz="914400" rtl="0" eaLnBrk="1" latinLnBrk="0" hangingPunct="1">
+      <a:lvl6pPr marL="1501719" indent="-136520" algn="l" defTabSz="546080" rtl="0" eaLnBrk="1" latinLnBrk="0" hangingPunct="1">
         <a:lnSpc>
           <a:spcPct val="90000"/>
         </a:lnSpc>
         <a:spcBef>
-          <a:spcPts val="500"/>
+          <a:spcPts val="299"/>
         </a:spcBef>
         <a:buFont typeface="Arial" panose="020B0604020202020204" pitchFamily="34" charset="0"/>
         <a:buChar char="•"/>
-        <a:defRPr sz="1800" kern="1200">
+        <a:defRPr sz="1075" kern="1200">
           <a:solidFill>
             <a:schemeClr val="tx1"/>
           </a:solidFill>
@@ -2798,16 +2806,16 @@
           <a:cs typeface="+mn-cs"/>
         </a:defRPr>
       </a:lvl6pPr>
-      <a:lvl7pPr marL="2971800" indent="-228600" algn="l" defTabSz="914400" rtl="0" eaLnBrk="1" latinLnBrk="0" hangingPunct="1">
+      <a:lvl7pPr marL="1774759" indent="-136520" algn="l" defTabSz="546080" rtl="0" eaLnBrk="1" latinLnBrk="0" hangingPunct="1">
         <a:lnSpc>
           <a:spcPct val="90000"/>
         </a:lnSpc>
         <a:spcBef>
-          <a:spcPts val="500"/>
+          <a:spcPts val="299"/>
         </a:spcBef>
         <a:buFont typeface="Arial" panose="020B0604020202020204" pitchFamily="34" charset="0"/>
         <a:buChar char="•"/>
-        <a:defRPr sz="1800" kern="1200">
+        <a:defRPr sz="1075" kern="1200">
           <a:solidFill>
             <a:schemeClr val="tx1"/>
           </a:solidFill>
@@ -2816,16 +2824,16 @@
           <a:cs typeface="+mn-cs"/>
         </a:defRPr>
       </a:lvl7pPr>
-      <a:lvl8pPr marL="3429000" indent="-228600" algn="l" defTabSz="914400" rtl="0" eaLnBrk="1" latinLnBrk="0" hangingPunct="1">
+      <a:lvl8pPr marL="2047799" indent="-136520" algn="l" defTabSz="546080" rtl="0" eaLnBrk="1" latinLnBrk="0" hangingPunct="1">
         <a:lnSpc>
           <a:spcPct val="90000"/>
         </a:lnSpc>
         <a:spcBef>
-          <a:spcPts val="500"/>
+          <a:spcPts val="299"/>
         </a:spcBef>
         <a:buFont typeface="Arial" panose="020B0604020202020204" pitchFamily="34" charset="0"/>
         <a:buChar char="•"/>
-        <a:defRPr sz="1800" kern="1200">
+        <a:defRPr sz="1075" kern="1200">
           <a:solidFill>
             <a:schemeClr val="tx1"/>
           </a:solidFill>
@@ -2834,16 +2842,16 @@
           <a:cs typeface="+mn-cs"/>
         </a:defRPr>
       </a:lvl8pPr>
-      <a:lvl9pPr marL="3886200" indent="-228600" algn="l" defTabSz="914400" rtl="0" eaLnBrk="1" latinLnBrk="0" hangingPunct="1">
+      <a:lvl9pPr marL="2320839" indent="-136520" algn="l" defTabSz="546080" rtl="0" eaLnBrk="1" latinLnBrk="0" hangingPunct="1">
         <a:lnSpc>
           <a:spcPct val="90000"/>
         </a:lnSpc>
         <a:spcBef>
-          <a:spcPts val="500"/>
+          <a:spcPts val="299"/>
         </a:spcBef>
         <a:buFont typeface="Arial" panose="020B0604020202020204" pitchFamily="34" charset="0"/>
         <a:buChar char="•"/>
-        <a:defRPr sz="1800" kern="1200">
+        <a:defRPr sz="1075" kern="1200">
           <a:solidFill>
             <a:schemeClr val="tx1"/>
           </a:solidFill>
@@ -2857,8 +2865,8 @@
       <a:defPPr>
         <a:defRPr lang="en-US"/>
       </a:defPPr>
-      <a:lvl1pPr marL="0" algn="l" defTabSz="914400" rtl="0" eaLnBrk="1" latinLnBrk="0" hangingPunct="1">
-        <a:defRPr sz="1800" kern="1200">
+      <a:lvl1pPr marL="0" algn="l" defTabSz="546080" rtl="0" eaLnBrk="1" latinLnBrk="0" hangingPunct="1">
+        <a:defRPr sz="1075" kern="1200">
           <a:solidFill>
             <a:schemeClr val="tx1"/>
           </a:solidFill>
@@ -2867,8 +2875,8 @@
           <a:cs typeface="+mn-cs"/>
         </a:defRPr>
       </a:lvl1pPr>
-      <a:lvl2pPr marL="457200" algn="l" defTabSz="914400" rtl="0" eaLnBrk="1" latinLnBrk="0" hangingPunct="1">
-        <a:defRPr sz="1800" kern="1200">
+      <a:lvl2pPr marL="273040" algn="l" defTabSz="546080" rtl="0" eaLnBrk="1" latinLnBrk="0" hangingPunct="1">
+        <a:defRPr sz="1075" kern="1200">
           <a:solidFill>
             <a:schemeClr val="tx1"/>
           </a:solidFill>
@@ -2877,8 +2885,8 @@
           <a:cs typeface="+mn-cs"/>
         </a:defRPr>
       </a:lvl2pPr>
-      <a:lvl3pPr marL="914400" algn="l" defTabSz="914400" rtl="0" eaLnBrk="1" latinLnBrk="0" hangingPunct="1">
-        <a:defRPr sz="1800" kern="1200">
+      <a:lvl3pPr marL="546080" algn="l" defTabSz="546080" rtl="0" eaLnBrk="1" latinLnBrk="0" hangingPunct="1">
+        <a:defRPr sz="1075" kern="1200">
           <a:solidFill>
             <a:schemeClr val="tx1"/>
           </a:solidFill>
@@ -2887,8 +2895,8 @@
           <a:cs typeface="+mn-cs"/>
         </a:defRPr>
       </a:lvl3pPr>
-      <a:lvl4pPr marL="1371600" algn="l" defTabSz="914400" rtl="0" eaLnBrk="1" latinLnBrk="0" hangingPunct="1">
-        <a:defRPr sz="1800" kern="1200">
+      <a:lvl4pPr marL="819120" algn="l" defTabSz="546080" rtl="0" eaLnBrk="1" latinLnBrk="0" hangingPunct="1">
+        <a:defRPr sz="1075" kern="1200">
           <a:solidFill>
             <a:schemeClr val="tx1"/>
           </a:solidFill>
@@ -2897,8 +2905,8 @@
           <a:cs typeface="+mn-cs"/>
         </a:defRPr>
       </a:lvl4pPr>
-      <a:lvl5pPr marL="1828800" algn="l" defTabSz="914400" rtl="0" eaLnBrk="1" latinLnBrk="0" hangingPunct="1">
-        <a:defRPr sz="1800" kern="1200">
+      <a:lvl5pPr marL="1092159" algn="l" defTabSz="546080" rtl="0" eaLnBrk="1" latinLnBrk="0" hangingPunct="1">
+        <a:defRPr sz="1075" kern="1200">
           <a:solidFill>
             <a:schemeClr val="tx1"/>
           </a:solidFill>
@@ -2907,8 +2915,8 @@
           <a:cs typeface="+mn-cs"/>
         </a:defRPr>
       </a:lvl5pPr>
-      <a:lvl6pPr marL="2286000" algn="l" defTabSz="914400" rtl="0" eaLnBrk="1" latinLnBrk="0" hangingPunct="1">
-        <a:defRPr sz="1800" kern="1200">
+      <a:lvl6pPr marL="1365199" algn="l" defTabSz="546080" rtl="0" eaLnBrk="1" latinLnBrk="0" hangingPunct="1">
+        <a:defRPr sz="1075" kern="1200">
           <a:solidFill>
             <a:schemeClr val="tx1"/>
           </a:solidFill>
@@ -2917,8 +2925,8 @@
           <a:cs typeface="+mn-cs"/>
         </a:defRPr>
       </a:lvl6pPr>
-      <a:lvl7pPr marL="2743200" algn="l" defTabSz="914400" rtl="0" eaLnBrk="1" latinLnBrk="0" hangingPunct="1">
-        <a:defRPr sz="1800" kern="1200">
+      <a:lvl7pPr marL="1638239" algn="l" defTabSz="546080" rtl="0" eaLnBrk="1" latinLnBrk="0" hangingPunct="1">
+        <a:defRPr sz="1075" kern="1200">
           <a:solidFill>
             <a:schemeClr val="tx1"/>
           </a:solidFill>
@@ -2927,8 +2935,8 @@
           <a:cs typeface="+mn-cs"/>
         </a:defRPr>
       </a:lvl7pPr>
-      <a:lvl8pPr marL="3200400" algn="l" defTabSz="914400" rtl="0" eaLnBrk="1" latinLnBrk="0" hangingPunct="1">
-        <a:defRPr sz="1800" kern="1200">
+      <a:lvl8pPr marL="1911279" algn="l" defTabSz="546080" rtl="0" eaLnBrk="1" latinLnBrk="0" hangingPunct="1">
+        <a:defRPr sz="1075" kern="1200">
           <a:solidFill>
             <a:schemeClr val="tx1"/>
           </a:solidFill>
@@ -2937,8 +2945,8 @@
           <a:cs typeface="+mn-cs"/>
         </a:defRPr>
       </a:lvl8pPr>
-      <a:lvl9pPr marL="3657600" algn="l" defTabSz="914400" rtl="0" eaLnBrk="1" latinLnBrk="0" hangingPunct="1">
-        <a:defRPr sz="1800" kern="1200">
+      <a:lvl9pPr marL="2184319" algn="l" defTabSz="546080" rtl="0" eaLnBrk="1" latinLnBrk="0" hangingPunct="1">
+        <a:defRPr sz="1075" kern="1200">
           <a:solidFill>
             <a:schemeClr val="tx1"/>
           </a:solidFill>
@@ -2971,6 +2979,724 @@
       </p:grpSpPr>
       <p:pic>
         <p:nvPicPr>
+          <p:cNvPr id="6" name="Picture 5"/>
+          <p:cNvPicPr>
+            <a:picLocks noChangeAspect="1"/>
+          </p:cNvPicPr>
+          <p:nvPr/>
+        </p:nvPicPr>
+        <p:blipFill>
+          <a:blip r:embed="rId2"/>
+          <a:stretch>
+            <a:fillRect/>
+          </a:stretch>
+        </p:blipFill>
+        <p:spPr>
+          <a:xfrm>
+            <a:off x="4939209" y="1"/>
+            <a:ext cx="5633541" cy="2039880"/>
+          </a:xfrm>
+          <a:prstGeom prst="rect">
+            <a:avLst/>
+          </a:prstGeom>
+        </p:spPr>
+      </p:pic>
+      <p:pic>
+        <p:nvPicPr>
+          <p:cNvPr id="7" name="Picture 6"/>
+          <p:cNvPicPr>
+            <a:picLocks noChangeAspect="1"/>
+          </p:cNvPicPr>
+          <p:nvPr/>
+        </p:nvPicPr>
+        <p:blipFill>
+          <a:blip r:embed="rId3"/>
+          <a:stretch>
+            <a:fillRect/>
+          </a:stretch>
+        </p:blipFill>
+        <p:spPr>
+          <a:xfrm>
+            <a:off x="4939209" y="2055870"/>
+            <a:ext cx="5633541" cy="2039880"/>
+          </a:xfrm>
+          <a:prstGeom prst="rect">
+            <a:avLst/>
+          </a:prstGeom>
+        </p:spPr>
+      </p:pic>
+      <p:pic>
+        <p:nvPicPr>
+          <p:cNvPr id="9" name="Picture 8"/>
+          <p:cNvPicPr>
+            <a:picLocks noChangeAspect="1"/>
+          </p:cNvPicPr>
+          <p:nvPr/>
+        </p:nvPicPr>
+        <p:blipFill>
+          <a:blip r:embed="rId4"/>
+          <a:stretch>
+            <a:fillRect/>
+          </a:stretch>
+        </p:blipFill>
+        <p:spPr>
+          <a:xfrm>
+            <a:off x="0" y="1"/>
+            <a:ext cx="4879798" cy="3935895"/>
+          </a:xfrm>
+          <a:prstGeom prst="rect">
+            <a:avLst/>
+          </a:prstGeom>
+        </p:spPr>
+      </p:pic>
+      <p:sp>
+        <p:nvSpPr>
+          <p:cNvPr id="11" name="Rectangle 10"/>
+          <p:cNvSpPr/>
+          <p:nvPr/>
+        </p:nvSpPr>
+        <p:spPr>
+          <a:xfrm>
+            <a:off x="0" y="3601941"/>
+            <a:ext cx="10572750" cy="421420"/>
+          </a:xfrm>
+          <a:prstGeom prst="rect">
+            <a:avLst/>
+          </a:prstGeom>
+          <a:solidFill>
+            <a:schemeClr val="tx1">
+              <a:lumMod val="65000"/>
+              <a:lumOff val="35000"/>
+              <a:alpha val="74000"/>
+            </a:schemeClr>
+          </a:solidFill>
+          <a:ln>
+            <a:noFill/>
+          </a:ln>
+        </p:spPr>
+        <p:style>
+          <a:lnRef idx="2">
+            <a:schemeClr val="accent1">
+              <a:shade val="50000"/>
+            </a:schemeClr>
+          </a:lnRef>
+          <a:fillRef idx="1">
+            <a:schemeClr val="accent1"/>
+          </a:fillRef>
+          <a:effectRef idx="0">
+            <a:schemeClr val="accent1"/>
+          </a:effectRef>
+          <a:fontRef idx="minor">
+            <a:schemeClr val="lt1"/>
+          </a:fontRef>
+        </p:style>
+        <p:txBody>
+          <a:bodyPr lIns="180000" rtlCol="0" anchor="ctr"/>
+          <a:lstStyle/>
+          <a:p>
+            <a:r>
+              <a:rPr lang="en-US" sz="1600" b="1" dirty="0">
+                <a:latin typeface="Microsoft Sans Serif" panose="020B0604020202020204" pitchFamily="34" charset="0"/>
+                <a:ea typeface="Verdana" panose="020B0604030504040204" pitchFamily="34" charset="0"/>
+                <a:cs typeface="Microsoft Sans Serif" panose="020B0604020202020204" pitchFamily="34" charset="0"/>
+              </a:rPr>
+              <a:t>Investigate airport domination, populate destinations and market share</a:t>
+            </a:r>
+            <a:endParaRPr lang="en-US" sz="1600" b="1" dirty="0">
+              <a:latin typeface="Microsoft Sans Serif" panose="020B0604020202020204" pitchFamily="34" charset="0"/>
+              <a:ea typeface="Verdana" panose="020B0604030504040204" pitchFamily="34" charset="0"/>
+              <a:cs typeface="Microsoft Sans Serif" panose="020B0604020202020204" pitchFamily="34" charset="0"/>
+            </a:endParaRPr>
+          </a:p>
+        </p:txBody>
+      </p:sp>
+    </p:spTree>
+    <p:extLst>
+      <p:ext uri="{BB962C8B-B14F-4D97-AF65-F5344CB8AC3E}">
+        <p14:creationId xmlns:p14="http://schemas.microsoft.com/office/powerpoint/2010/main" val="1816916648"/>
+      </p:ext>
+    </p:extLst>
+  </p:cSld>
+  <p:clrMapOvr>
+    <a:masterClrMapping/>
+  </p:clrMapOvr>
+</p:sld>
+</file>
+
+<file path=ppt/slides/slide2.xml><?xml version="1.0" encoding="utf-8"?>
+<p:sld xmlns:a="http://schemas.openxmlformats.org/drawingml/2006/main" xmlns:r="http://schemas.openxmlformats.org/officeDocument/2006/relationships" xmlns:p="http://schemas.openxmlformats.org/presentationml/2006/main">
+  <p:cSld>
+    <p:spTree>
+      <p:nvGrpSpPr>
+        <p:cNvPr id="1" name=""/>
+        <p:cNvGrpSpPr/>
+        <p:nvPr/>
+      </p:nvGrpSpPr>
+      <p:grpSpPr>
+        <a:xfrm>
+          <a:off x="0" y="0"/>
+          <a:ext cx="0" cy="0"/>
+          <a:chOff x="0" y="0"/>
+          <a:chExt cx="0" cy="0"/>
+        </a:xfrm>
+      </p:grpSpPr>
+      <p:pic>
+        <p:nvPicPr>
+          <p:cNvPr id="4" name="Picture 3"/>
+          <p:cNvPicPr>
+            <a:picLocks noChangeAspect="1"/>
+          </p:cNvPicPr>
+          <p:nvPr/>
+        </p:nvPicPr>
+        <p:blipFill>
+          <a:blip r:embed="rId2"/>
+          <a:stretch>
+            <a:fillRect/>
+          </a:stretch>
+        </p:blipFill>
+        <p:spPr>
+          <a:xfrm>
+            <a:off x="0" y="0"/>
+            <a:ext cx="7239000" cy="400050"/>
+          </a:xfrm>
+          <a:prstGeom prst="rect">
+            <a:avLst/>
+          </a:prstGeom>
+        </p:spPr>
+      </p:pic>
+      <p:pic>
+        <p:nvPicPr>
+          <p:cNvPr id="5" name="Picture 4"/>
+          <p:cNvPicPr>
+            <a:picLocks noChangeAspect="1"/>
+          </p:cNvPicPr>
+          <p:nvPr/>
+        </p:nvPicPr>
+        <p:blipFill>
+          <a:blip r:embed="rId3"/>
+          <a:stretch>
+            <a:fillRect/>
+          </a:stretch>
+        </p:blipFill>
+        <p:spPr>
+          <a:xfrm>
+            <a:off x="0" y="507888"/>
+            <a:ext cx="3408679" cy="3587862"/>
+          </a:xfrm>
+          <a:prstGeom prst="rect">
+            <a:avLst/>
+          </a:prstGeom>
+        </p:spPr>
+      </p:pic>
+      <p:pic>
+        <p:nvPicPr>
+          <p:cNvPr id="8" name="Picture 7"/>
+          <p:cNvPicPr>
+            <a:picLocks noChangeAspect="1"/>
+          </p:cNvPicPr>
+          <p:nvPr/>
+        </p:nvPicPr>
+        <p:blipFill>
+          <a:blip r:embed="rId4"/>
+          <a:stretch>
+            <a:fillRect/>
+          </a:stretch>
+        </p:blipFill>
+        <p:spPr>
+          <a:xfrm>
+            <a:off x="7172548" y="507888"/>
+            <a:ext cx="3437543" cy="3587862"/>
+          </a:xfrm>
+          <a:prstGeom prst="rect">
+            <a:avLst/>
+          </a:prstGeom>
+        </p:spPr>
+      </p:pic>
+      <p:pic>
+        <p:nvPicPr>
+          <p:cNvPr id="9" name="Picture 8"/>
+          <p:cNvPicPr>
+            <a:picLocks noChangeAspect="1"/>
+          </p:cNvPicPr>
+          <p:nvPr/>
+        </p:nvPicPr>
+        <p:blipFill rotWithShape="1">
+          <a:blip r:embed="rId5"/>
+          <a:srcRect t="11458" b="14340"/>
+          <a:stretch/>
+        </p:blipFill>
+        <p:spPr>
+          <a:xfrm>
+            <a:off x="3489137" y="2369489"/>
+            <a:ext cx="3643183" cy="1726261"/>
+          </a:xfrm>
+          <a:prstGeom prst="rect">
+            <a:avLst/>
+          </a:prstGeom>
+        </p:spPr>
+      </p:pic>
+      <p:pic>
+        <p:nvPicPr>
+          <p:cNvPr id="11" name="Picture 10"/>
+          <p:cNvPicPr>
+            <a:picLocks noChangeAspect="1"/>
+          </p:cNvPicPr>
+          <p:nvPr/>
+        </p:nvPicPr>
+        <p:blipFill>
+          <a:blip r:embed="rId6"/>
+          <a:stretch>
+            <a:fillRect/>
+          </a:stretch>
+        </p:blipFill>
+        <p:spPr>
+          <a:xfrm>
+            <a:off x="3489137" y="507888"/>
+            <a:ext cx="3643183" cy="1742332"/>
+          </a:xfrm>
+          <a:prstGeom prst="rect">
+            <a:avLst/>
+          </a:prstGeom>
+        </p:spPr>
+      </p:pic>
+      <p:sp>
+        <p:nvSpPr>
+          <p:cNvPr id="13" name="Rectangle 12"/>
+          <p:cNvSpPr/>
+          <p:nvPr/>
+        </p:nvSpPr>
+        <p:spPr>
+          <a:xfrm>
+            <a:off x="0" y="3601941"/>
+            <a:ext cx="10572750" cy="421420"/>
+          </a:xfrm>
+          <a:prstGeom prst="rect">
+            <a:avLst/>
+          </a:prstGeom>
+          <a:solidFill>
+            <a:schemeClr val="tx1">
+              <a:lumMod val="65000"/>
+              <a:lumOff val="35000"/>
+              <a:alpha val="74000"/>
+            </a:schemeClr>
+          </a:solidFill>
+          <a:ln>
+            <a:noFill/>
+          </a:ln>
+        </p:spPr>
+        <p:style>
+          <a:lnRef idx="2">
+            <a:schemeClr val="accent1">
+              <a:shade val="50000"/>
+            </a:schemeClr>
+          </a:lnRef>
+          <a:fillRef idx="1">
+            <a:schemeClr val="accent1"/>
+          </a:fillRef>
+          <a:effectRef idx="0">
+            <a:schemeClr val="accent1"/>
+          </a:effectRef>
+          <a:fontRef idx="minor">
+            <a:schemeClr val="lt1"/>
+          </a:fontRef>
+        </p:style>
+        <p:txBody>
+          <a:bodyPr lIns="180000" rtlCol="0" anchor="ctr"/>
+          <a:lstStyle/>
+          <a:p>
+            <a:r>
+              <a:rPr lang="en-US" sz="1600" b="1" dirty="0" smtClean="0">
+                <a:latin typeface="Microsoft Sans Serif" panose="020B0604020202020204" pitchFamily="34" charset="0"/>
+                <a:ea typeface="Verdana" panose="020B0604030504040204" pitchFamily="34" charset="0"/>
+                <a:cs typeface="Microsoft Sans Serif" panose="020B0604020202020204" pitchFamily="34" charset="0"/>
+              </a:rPr>
+              <a:t>Valuable data date back to 1990 with interesting findings</a:t>
+            </a:r>
+            <a:endParaRPr lang="en-US" sz="1600" b="1" dirty="0">
+              <a:latin typeface="Microsoft Sans Serif" panose="020B0604020202020204" pitchFamily="34" charset="0"/>
+              <a:ea typeface="Verdana" panose="020B0604030504040204" pitchFamily="34" charset="0"/>
+              <a:cs typeface="Microsoft Sans Serif" panose="020B0604020202020204" pitchFamily="34" charset="0"/>
+            </a:endParaRPr>
+          </a:p>
+        </p:txBody>
+      </p:sp>
+    </p:spTree>
+    <p:extLst>
+      <p:ext uri="{BB962C8B-B14F-4D97-AF65-F5344CB8AC3E}">
+        <p14:creationId xmlns:p14="http://schemas.microsoft.com/office/powerpoint/2010/main" val="2191503671"/>
+      </p:ext>
+    </p:extLst>
+  </p:cSld>
+  <p:clrMapOvr>
+    <a:masterClrMapping/>
+  </p:clrMapOvr>
+</p:sld>
+</file>
+
+<file path=ppt/slides/slide3.xml><?xml version="1.0" encoding="utf-8"?>
+<p:sld xmlns:a="http://schemas.openxmlformats.org/drawingml/2006/main" xmlns:r="http://schemas.openxmlformats.org/officeDocument/2006/relationships" xmlns:p="http://schemas.openxmlformats.org/presentationml/2006/main">
+  <p:cSld>
+    <p:spTree>
+      <p:nvGrpSpPr>
+        <p:cNvPr id="1" name=""/>
+        <p:cNvGrpSpPr/>
+        <p:nvPr/>
+      </p:nvGrpSpPr>
+      <p:grpSpPr>
+        <a:xfrm>
+          <a:off x="0" y="0"/>
+          <a:ext cx="0" cy="0"/>
+          <a:chOff x="0" y="0"/>
+          <a:chExt cx="0" cy="0"/>
+        </a:xfrm>
+      </p:grpSpPr>
+      <p:pic>
+        <p:nvPicPr>
+          <p:cNvPr id="6" name="Picture 5"/>
+          <p:cNvPicPr>
+            <a:picLocks noChangeAspect="1"/>
+          </p:cNvPicPr>
+          <p:nvPr/>
+        </p:nvPicPr>
+        <p:blipFill>
+          <a:blip r:embed="rId2"/>
+          <a:stretch>
+            <a:fillRect/>
+          </a:stretch>
+        </p:blipFill>
+        <p:spPr>
+          <a:xfrm>
+            <a:off x="0" y="0"/>
+            <a:ext cx="9990846" cy="4095750"/>
+          </a:xfrm>
+          <a:prstGeom prst="rect">
+            <a:avLst/>
+          </a:prstGeom>
+        </p:spPr>
+      </p:pic>
+      <p:pic>
+        <p:nvPicPr>
+          <p:cNvPr id="7" name="Picture 6"/>
+          <p:cNvPicPr>
+            <a:picLocks noChangeAspect="1"/>
+          </p:cNvPicPr>
+          <p:nvPr/>
+        </p:nvPicPr>
+        <p:blipFill>
+          <a:blip r:embed="rId3"/>
+          <a:stretch>
+            <a:fillRect/>
+          </a:stretch>
+        </p:blipFill>
+        <p:spPr>
+          <a:xfrm>
+            <a:off x="7932710" y="2400743"/>
+            <a:ext cx="2640040" cy="1695007"/>
+          </a:xfrm>
+          <a:prstGeom prst="rect">
+            <a:avLst/>
+          </a:prstGeom>
+        </p:spPr>
+      </p:pic>
+      <p:sp>
+        <p:nvSpPr>
+          <p:cNvPr id="9" name="Rectangle 8"/>
+          <p:cNvSpPr/>
+          <p:nvPr/>
+        </p:nvSpPr>
+        <p:spPr>
+          <a:xfrm>
+            <a:off x="0" y="3601941"/>
+            <a:ext cx="10572750" cy="421420"/>
+          </a:xfrm>
+          <a:prstGeom prst="rect">
+            <a:avLst/>
+          </a:prstGeom>
+          <a:solidFill>
+            <a:schemeClr val="tx1">
+              <a:lumMod val="65000"/>
+              <a:lumOff val="35000"/>
+              <a:alpha val="74000"/>
+            </a:schemeClr>
+          </a:solidFill>
+          <a:ln>
+            <a:noFill/>
+          </a:ln>
+        </p:spPr>
+        <p:style>
+          <a:lnRef idx="2">
+            <a:schemeClr val="accent1">
+              <a:shade val="50000"/>
+            </a:schemeClr>
+          </a:lnRef>
+          <a:fillRef idx="1">
+            <a:schemeClr val="accent1"/>
+          </a:fillRef>
+          <a:effectRef idx="0">
+            <a:schemeClr val="accent1"/>
+          </a:effectRef>
+          <a:fontRef idx="minor">
+            <a:schemeClr val="lt1"/>
+          </a:fontRef>
+        </p:style>
+        <p:txBody>
+          <a:bodyPr lIns="180000" rtlCol="0" anchor="ctr"/>
+          <a:lstStyle/>
+          <a:p>
+            <a:r>
+              <a:rPr lang="en-US" sz="1600" b="1" dirty="0" smtClean="0">
+                <a:latin typeface="Microsoft Sans Serif" panose="020B0604020202020204" pitchFamily="34" charset="0"/>
+                <a:ea typeface="Verdana" panose="020B0604030504040204" pitchFamily="34" charset="0"/>
+                <a:cs typeface="Microsoft Sans Serif" panose="020B0604020202020204" pitchFamily="34" charset="0"/>
+              </a:rPr>
+              <a:t>Hub-and-spoke structure: visualize the global airline network</a:t>
+            </a:r>
+            <a:endParaRPr lang="en-US" sz="1600" b="1" dirty="0">
+              <a:latin typeface="Microsoft Sans Serif" panose="020B0604020202020204" pitchFamily="34" charset="0"/>
+              <a:ea typeface="Verdana" panose="020B0604030504040204" pitchFamily="34" charset="0"/>
+              <a:cs typeface="Microsoft Sans Serif" panose="020B0604020202020204" pitchFamily="34" charset="0"/>
+            </a:endParaRPr>
+          </a:p>
+        </p:txBody>
+      </p:sp>
+    </p:spTree>
+    <p:extLst>
+      <p:ext uri="{BB962C8B-B14F-4D97-AF65-F5344CB8AC3E}">
+        <p14:creationId xmlns:p14="http://schemas.microsoft.com/office/powerpoint/2010/main" val="4057804224"/>
+      </p:ext>
+    </p:extLst>
+  </p:cSld>
+  <p:clrMapOvr>
+    <a:masterClrMapping/>
+  </p:clrMapOvr>
+</p:sld>
+</file>
+
+<file path=ppt/slides/slide4.xml><?xml version="1.0" encoding="utf-8"?>
+<p:sld xmlns:a="http://schemas.openxmlformats.org/drawingml/2006/main" xmlns:r="http://schemas.openxmlformats.org/officeDocument/2006/relationships" xmlns:p="http://schemas.openxmlformats.org/presentationml/2006/main">
+  <p:cSld>
+    <p:spTree>
+      <p:nvGrpSpPr>
+        <p:cNvPr id="1" name=""/>
+        <p:cNvGrpSpPr/>
+        <p:nvPr/>
+      </p:nvGrpSpPr>
+      <p:grpSpPr>
+        <a:xfrm>
+          <a:off x="0" y="0"/>
+          <a:ext cx="0" cy="0"/>
+          <a:chOff x="0" y="0"/>
+          <a:chExt cx="0" cy="0"/>
+        </a:xfrm>
+      </p:grpSpPr>
+      <p:pic>
+        <p:nvPicPr>
+          <p:cNvPr id="4" name="Picture 3"/>
+          <p:cNvPicPr>
+            <a:picLocks noChangeAspect="1"/>
+          </p:cNvPicPr>
+          <p:nvPr/>
+        </p:nvPicPr>
+        <p:blipFill>
+          <a:blip r:embed="rId2"/>
+          <a:stretch>
+            <a:fillRect/>
+          </a:stretch>
+        </p:blipFill>
+        <p:spPr>
+          <a:xfrm>
+            <a:off x="-1" y="62567"/>
+            <a:ext cx="8915623" cy="1929934"/>
+          </a:xfrm>
+          <a:prstGeom prst="rect">
+            <a:avLst/>
+          </a:prstGeom>
+        </p:spPr>
+      </p:pic>
+      <p:pic>
+        <p:nvPicPr>
+          <p:cNvPr id="5" name="Picture 4"/>
+          <p:cNvPicPr>
+            <a:picLocks noChangeAspect="1"/>
+          </p:cNvPicPr>
+          <p:nvPr/>
+        </p:nvPicPr>
+        <p:blipFill>
+          <a:blip r:embed="rId3"/>
+          <a:stretch>
+            <a:fillRect/>
+          </a:stretch>
+        </p:blipFill>
+        <p:spPr>
+          <a:xfrm>
+            <a:off x="0" y="2119723"/>
+            <a:ext cx="8831347" cy="1903638"/>
+          </a:xfrm>
+          <a:prstGeom prst="rect">
+            <a:avLst/>
+          </a:prstGeom>
+        </p:spPr>
+      </p:pic>
+      <p:pic>
+        <p:nvPicPr>
+          <p:cNvPr id="1026" name="Picture 2" descr="File:Cincinnatiairportlogo.jpeg">
+            <a:hlinkClick r:id="rId4"/>
+          </p:cNvPr>
+          <p:cNvPicPr>
+            <a:picLocks noChangeAspect="1" noChangeArrowheads="1"/>
+          </p:cNvPicPr>
+          <p:nvPr/>
+        </p:nvPicPr>
+        <p:blipFill>
+          <a:blip r:embed="rId5">
+            <a:extLst>
+              <a:ext uri="{28A0092B-C50C-407E-A947-70E740481C1C}">
+                <a14:useLocalDpi xmlns:a14="http://schemas.microsoft.com/office/drawing/2010/main" val="0"/>
+              </a:ext>
+            </a:extLst>
+          </a:blip>
+          <a:srcRect/>
+          <a:stretch>
+            <a:fillRect/>
+          </a:stretch>
+        </p:blipFill>
+        <p:spPr bwMode="auto">
+          <a:xfrm>
+            <a:off x="8150087" y="768270"/>
+            <a:ext cx="2422663" cy="1143497"/>
+          </a:xfrm>
+          <a:prstGeom prst="rect">
+            <a:avLst/>
+          </a:prstGeom>
+          <a:noFill/>
+          <a:extLst>
+            <a:ext uri="{909E8E84-426E-40DD-AFC4-6F175D3DCCD1}">
+              <a14:hiddenFill xmlns:a14="http://schemas.microsoft.com/office/drawing/2010/main">
+                <a:solidFill>
+                  <a:srgbClr val="FFFFFF"/>
+                </a:solidFill>
+              </a14:hiddenFill>
+            </a:ext>
+          </a:extLst>
+        </p:spPr>
+      </p:pic>
+      <p:pic>
+        <p:nvPicPr>
+          <p:cNvPr id="6" name="Picture 5"/>
+          <p:cNvPicPr>
+            <a:picLocks noChangeAspect="1"/>
+          </p:cNvPicPr>
+          <p:nvPr/>
+        </p:nvPicPr>
+        <p:blipFill>
+          <a:blip r:embed="rId6"/>
+          <a:stretch>
+            <a:fillRect/>
+          </a:stretch>
+        </p:blipFill>
+        <p:spPr>
+          <a:xfrm>
+            <a:off x="8187776" y="2918129"/>
+            <a:ext cx="2384974" cy="1105232"/>
+          </a:xfrm>
+          <a:prstGeom prst="rect">
+            <a:avLst/>
+          </a:prstGeom>
+        </p:spPr>
+      </p:pic>
+      <p:sp>
+        <p:nvSpPr>
+          <p:cNvPr id="9" name="Rectangle 8"/>
+          <p:cNvSpPr/>
+          <p:nvPr/>
+        </p:nvSpPr>
+        <p:spPr>
+          <a:xfrm>
+            <a:off x="0" y="3601941"/>
+            <a:ext cx="10572750" cy="421420"/>
+          </a:xfrm>
+          <a:prstGeom prst="rect">
+            <a:avLst/>
+          </a:prstGeom>
+          <a:solidFill>
+            <a:schemeClr val="tx1">
+              <a:lumMod val="65000"/>
+              <a:lumOff val="35000"/>
+              <a:alpha val="74000"/>
+            </a:schemeClr>
+          </a:solidFill>
+          <a:ln>
+            <a:noFill/>
+          </a:ln>
+        </p:spPr>
+        <p:style>
+          <a:lnRef idx="2">
+            <a:schemeClr val="accent1">
+              <a:shade val="50000"/>
+            </a:schemeClr>
+          </a:lnRef>
+          <a:fillRef idx="1">
+            <a:schemeClr val="accent1"/>
+          </a:fillRef>
+          <a:effectRef idx="0">
+            <a:schemeClr val="accent1"/>
+          </a:effectRef>
+          <a:fontRef idx="minor">
+            <a:schemeClr val="lt1"/>
+          </a:fontRef>
+        </p:style>
+        <p:txBody>
+          <a:bodyPr lIns="180000" rtlCol="0" anchor="ctr"/>
+          <a:lstStyle/>
+          <a:p>
+            <a:r>
+              <a:rPr lang="en-US" sz="1600" b="1" dirty="0" smtClean="0">
+                <a:latin typeface="Microsoft Sans Serif" panose="020B0604020202020204" pitchFamily="34" charset="0"/>
+                <a:ea typeface="Verdana" panose="020B0604030504040204" pitchFamily="34" charset="0"/>
+                <a:cs typeface="Microsoft Sans Serif" panose="020B0604020202020204" pitchFamily="34" charset="0"/>
+              </a:rPr>
+              <a:t>Airport is declining or developing? Figure it out.</a:t>
+            </a:r>
+            <a:endParaRPr lang="en-US" sz="1600" b="1" dirty="0">
+              <a:latin typeface="Microsoft Sans Serif" panose="020B0604020202020204" pitchFamily="34" charset="0"/>
+              <a:ea typeface="Verdana" panose="020B0604030504040204" pitchFamily="34" charset="0"/>
+              <a:cs typeface="Microsoft Sans Serif" panose="020B0604020202020204" pitchFamily="34" charset="0"/>
+            </a:endParaRPr>
+          </a:p>
+        </p:txBody>
+      </p:sp>
+    </p:spTree>
+    <p:extLst>
+      <p:ext uri="{BB962C8B-B14F-4D97-AF65-F5344CB8AC3E}">
+        <p14:creationId xmlns:p14="http://schemas.microsoft.com/office/powerpoint/2010/main" val="561212396"/>
+      </p:ext>
+    </p:extLst>
+  </p:cSld>
+  <p:clrMapOvr>
+    <a:masterClrMapping/>
+  </p:clrMapOvr>
+</p:sld>
+</file>
+
+<file path=ppt/slides/slide5.xml><?xml version="1.0" encoding="utf-8"?>
+<p:sld xmlns:a="http://schemas.openxmlformats.org/drawingml/2006/main" xmlns:r="http://schemas.openxmlformats.org/officeDocument/2006/relationships" xmlns:p="http://schemas.openxmlformats.org/presentationml/2006/main">
+  <p:cSld>
+    <p:spTree>
+      <p:nvGrpSpPr>
+        <p:cNvPr id="1" name=""/>
+        <p:cNvGrpSpPr/>
+        <p:nvPr/>
+      </p:nvGrpSpPr>
+      <p:grpSpPr>
+        <a:xfrm>
+          <a:off x="0" y="0"/>
+          <a:ext cx="0" cy="0"/>
+          <a:chOff x="0" y="0"/>
+          <a:chExt cx="0" cy="0"/>
+        </a:xfrm>
+      </p:grpSpPr>
+      <p:pic>
+        <p:nvPicPr>
           <p:cNvPr id="2" name="Picture 1"/>
           <p:cNvPicPr>
             <a:picLocks noChangeAspect="1"/>
@@ -2985,14 +3711,75 @@
         </p:blipFill>
         <p:spPr>
           <a:xfrm>
-            <a:off x="60447" y="97343"/>
-            <a:ext cx="8599000" cy="3153980"/>
+            <a:off x="0" y="-66676"/>
+            <a:ext cx="11348420" cy="4162425"/>
           </a:xfrm>
           <a:prstGeom prst="rect">
             <a:avLst/>
           </a:prstGeom>
         </p:spPr>
       </p:pic>
+      <p:sp>
+        <p:nvSpPr>
+          <p:cNvPr id="3" name="Rectangle 2"/>
+          <p:cNvSpPr/>
+          <p:nvPr/>
+        </p:nvSpPr>
+        <p:spPr>
+          <a:xfrm>
+            <a:off x="0" y="3601941"/>
+            <a:ext cx="10572750" cy="421420"/>
+          </a:xfrm>
+          <a:prstGeom prst="rect">
+            <a:avLst/>
+          </a:prstGeom>
+          <a:solidFill>
+            <a:schemeClr val="tx1">
+              <a:lumMod val="65000"/>
+              <a:lumOff val="35000"/>
+              <a:alpha val="74000"/>
+            </a:schemeClr>
+          </a:solidFill>
+          <a:ln>
+            <a:noFill/>
+          </a:ln>
+        </p:spPr>
+        <p:style>
+          <a:lnRef idx="2">
+            <a:schemeClr val="accent1">
+              <a:shade val="50000"/>
+            </a:schemeClr>
+          </a:lnRef>
+          <a:fillRef idx="1">
+            <a:schemeClr val="accent1"/>
+          </a:fillRef>
+          <a:effectRef idx="0">
+            <a:schemeClr val="accent1"/>
+          </a:effectRef>
+          <a:fontRef idx="minor">
+            <a:schemeClr val="lt1"/>
+          </a:fontRef>
+        </p:style>
+        <p:txBody>
+          <a:bodyPr lIns="180000" rtlCol="0" anchor="ctr"/>
+          <a:lstStyle/>
+          <a:p>
+            <a:r>
+              <a:rPr lang="en-US" sz="1600" b="1" dirty="0" smtClean="0">
+                <a:latin typeface="Microsoft Sans Serif" panose="020B0604020202020204" pitchFamily="34" charset="0"/>
+                <a:ea typeface="Verdana" panose="020B0604030504040204" pitchFamily="34" charset="0"/>
+                <a:cs typeface="Microsoft Sans Serif" panose="020B0604020202020204" pitchFamily="34" charset="0"/>
+              </a:rPr>
+              <a:t>New aviation data from Asian data sources</a:t>
+            </a:r>
+            <a:endParaRPr lang="en-US" sz="1600" b="1" dirty="0">
+              <a:latin typeface="Microsoft Sans Serif" panose="020B0604020202020204" pitchFamily="34" charset="0"/>
+              <a:ea typeface="Verdana" panose="020B0604030504040204" pitchFamily="34" charset="0"/>
+              <a:cs typeface="Microsoft Sans Serif" panose="020B0604020202020204" pitchFamily="34" charset="0"/>
+            </a:endParaRPr>
+          </a:p>
+        </p:txBody>
+      </p:sp>
     </p:spTree>
     <p:extLst>
       <p:ext uri="{BB962C8B-B14F-4D97-AF65-F5344CB8AC3E}">
@@ -3003,13 +3790,20 @@
   <p:clrMapOvr>
     <a:masterClrMapping/>
   </p:clrMapOvr>
+  <p:timing>
+    <p:tnLst>
+      <p:par>
+        <p:cTn id="1" dur="indefinite" restart="never" nodeType="tmRoot"/>
+      </p:par>
+    </p:tnLst>
+  </p:timing>
 </p:sld>
 </file>
 
 <file path=ppt/theme/theme1.xml><?xml version="1.0" encoding="utf-8"?>
 <a:theme xmlns:a="http://schemas.openxmlformats.org/drawingml/2006/main" name="Office Theme">
   <a:themeElements>
-    <a:clrScheme name="Office">
+    <a:clrScheme name="Office Theme">
       <a:dk1>
         <a:sysClr val="windowText" lastClr="000000"/>
       </a:dk1>
@@ -3047,7 +3841,7 @@
         <a:srgbClr val="954F72"/>
       </a:folHlink>
     </a:clrScheme>
-    <a:fontScheme name="Office">
+    <a:fontScheme name="Office Theme">
       <a:majorFont>
         <a:latin typeface="Calibri Light" panose="020F0302020204030204"/>
         <a:ea typeface=""/>
@@ -3119,7 +3913,7 @@
         <a:font script="Geor" typeface="Sylfaen"/>
       </a:minorFont>
     </a:fontScheme>
-    <a:fmtScheme name="Office">
+    <a:fmtScheme name="Office Theme">
       <a:fillStyleLst>
         <a:solidFill>
           <a:schemeClr val="phClr"/>

</xml_diff>

<commit_message>
Introduction page in Chinese.
</commit_message>
<xml_diff>
--- a/doc/Introduction.pptx
+++ b/doc/Introduction.pptx
@@ -247,7 +247,7 @@
           <a:p>
             <a:fld id="{8BFA4859-2580-4F48-B58C-0AA8ECFD10A0}" type="datetimeFigureOut">
               <a:rPr lang="en-US" smtClean="0"/>
-              <a:t>8/9/2014</a:t>
+              <a:t>8/15/2014</a:t>
             </a:fld>
             <a:endParaRPr lang="en-US"/>
           </a:p>
@@ -417,7 +417,7 @@
           <a:p>
             <a:fld id="{8BFA4859-2580-4F48-B58C-0AA8ECFD10A0}" type="datetimeFigureOut">
               <a:rPr lang="en-US" smtClean="0"/>
-              <a:t>8/9/2014</a:t>
+              <a:t>8/15/2014</a:t>
             </a:fld>
             <a:endParaRPr lang="en-US"/>
           </a:p>
@@ -597,7 +597,7 @@
           <a:p>
             <a:fld id="{8BFA4859-2580-4F48-B58C-0AA8ECFD10A0}" type="datetimeFigureOut">
               <a:rPr lang="en-US" smtClean="0"/>
-              <a:t>8/9/2014</a:t>
+              <a:t>8/15/2014</a:t>
             </a:fld>
             <a:endParaRPr lang="en-US"/>
           </a:p>
@@ -767,7 +767,7 @@
           <a:p>
             <a:fld id="{8BFA4859-2580-4F48-B58C-0AA8ECFD10A0}" type="datetimeFigureOut">
               <a:rPr lang="en-US" smtClean="0"/>
-              <a:t>8/9/2014</a:t>
+              <a:t>8/15/2014</a:t>
             </a:fld>
             <a:endParaRPr lang="en-US"/>
           </a:p>
@@ -1013,7 +1013,7 @@
           <a:p>
             <a:fld id="{8BFA4859-2580-4F48-B58C-0AA8ECFD10A0}" type="datetimeFigureOut">
               <a:rPr lang="en-US" smtClean="0"/>
-              <a:t>8/9/2014</a:t>
+              <a:t>8/15/2014</a:t>
             </a:fld>
             <a:endParaRPr lang="en-US"/>
           </a:p>
@@ -1245,7 +1245,7 @@
           <a:p>
             <a:fld id="{8BFA4859-2580-4F48-B58C-0AA8ECFD10A0}" type="datetimeFigureOut">
               <a:rPr lang="en-US" smtClean="0"/>
-              <a:t>8/9/2014</a:t>
+              <a:t>8/15/2014</a:t>
             </a:fld>
             <a:endParaRPr lang="en-US"/>
           </a:p>
@@ -1612,7 +1612,7 @@
           <a:p>
             <a:fld id="{8BFA4859-2580-4F48-B58C-0AA8ECFD10A0}" type="datetimeFigureOut">
               <a:rPr lang="en-US" smtClean="0"/>
-              <a:t>8/9/2014</a:t>
+              <a:t>8/15/2014</a:t>
             </a:fld>
             <a:endParaRPr lang="en-US"/>
           </a:p>
@@ -1730,7 +1730,7 @@
           <a:p>
             <a:fld id="{8BFA4859-2580-4F48-B58C-0AA8ECFD10A0}" type="datetimeFigureOut">
               <a:rPr lang="en-US" smtClean="0"/>
-              <a:t>8/9/2014</a:t>
+              <a:t>8/15/2014</a:t>
             </a:fld>
             <a:endParaRPr lang="en-US"/>
           </a:p>
@@ -1825,7 +1825,7 @@
           <a:p>
             <a:fld id="{8BFA4859-2580-4F48-B58C-0AA8ECFD10A0}" type="datetimeFigureOut">
               <a:rPr lang="en-US" smtClean="0"/>
-              <a:t>8/9/2014</a:t>
+              <a:t>8/15/2014</a:t>
             </a:fld>
             <a:endParaRPr lang="en-US"/>
           </a:p>
@@ -2102,7 +2102,7 @@
           <a:p>
             <a:fld id="{8BFA4859-2580-4F48-B58C-0AA8ECFD10A0}" type="datetimeFigureOut">
               <a:rPr lang="en-US" smtClean="0"/>
-              <a:t>8/9/2014</a:t>
+              <a:t>8/15/2014</a:t>
             </a:fld>
             <a:endParaRPr lang="en-US"/>
           </a:p>
@@ -2359,7 +2359,7 @@
           <a:p>
             <a:fld id="{8BFA4859-2580-4F48-B58C-0AA8ECFD10A0}" type="datetimeFigureOut">
               <a:rPr lang="en-US" smtClean="0"/>
-              <a:t>8/9/2014</a:t>
+              <a:t>8/15/2014</a:t>
             </a:fld>
             <a:endParaRPr lang="en-US"/>
           </a:p>
@@ -2572,7 +2572,7 @@
           <a:p>
             <a:fld id="{8BFA4859-2580-4F48-B58C-0AA8ECFD10A0}" type="datetimeFigureOut">
               <a:rPr lang="en-US" smtClean="0"/>
-              <a:t>8/9/2014</a:t>
+              <a:t>8/15/2014</a:t>
             </a:fld>
             <a:endParaRPr lang="en-US"/>
           </a:p>
@@ -3095,12 +3095,28 @@
           <a:lstStyle/>
           <a:p>
             <a:r>
-              <a:rPr lang="en-US" sz="1600" b="1" dirty="0">
+              <a:rPr lang="en-US" sz="1600" b="1" dirty="0" smtClean="0">
                 <a:latin typeface="Microsoft Sans Serif" panose="020B0604020202020204" pitchFamily="34" charset="0"/>
                 <a:ea typeface="Verdana" panose="020B0604030504040204" pitchFamily="34" charset="0"/>
                 <a:cs typeface="Microsoft Sans Serif" panose="020B0604020202020204" pitchFamily="34" charset="0"/>
               </a:rPr>
-              <a:t>Investigate airport domination, populate destinations and market share</a:t>
+              <a:t>Investigate airport domination, popula</a:t>
+            </a:r>
+            <a:r>
+              <a:rPr lang="en-US" altLang="zh-CN" sz="1600" b="1" dirty="0" smtClean="0">
+                <a:latin typeface="Microsoft Sans Serif" panose="020B0604020202020204" pitchFamily="34" charset="0"/>
+                <a:ea typeface="Verdana" panose="020B0604030504040204" pitchFamily="34" charset="0"/>
+                <a:cs typeface="Microsoft Sans Serif" panose="020B0604020202020204" pitchFamily="34" charset="0"/>
+              </a:rPr>
+              <a:t>r</a:t>
+            </a:r>
+            <a:r>
+              <a:rPr lang="en-US" sz="1600" b="1" dirty="0" smtClean="0">
+                <a:latin typeface="Microsoft Sans Serif" panose="020B0604020202020204" pitchFamily="34" charset="0"/>
+                <a:ea typeface="Verdana" panose="020B0604030504040204" pitchFamily="34" charset="0"/>
+                <a:cs typeface="Microsoft Sans Serif" panose="020B0604020202020204" pitchFamily="34" charset="0"/>
+              </a:rPr>
+              <a:t> destinations and market share</a:t>
             </a:r>
             <a:endParaRPr lang="en-US" sz="1600" b="1" dirty="0">
               <a:latin typeface="Microsoft Sans Serif" panose="020B0604020202020204" pitchFamily="34" charset="0"/>

</xml_diff>